<commit_message>
Updated the daily agenda and added a new Lecture 4 R script
</commit_message>
<xml_diff>
--- a/TMATH390InClassRProj/TMATH390Au19MW_DailyAgenda.pptx
+++ b/TMATH390InClassRProj/TMATH390Au19MW_DailyAgenda.pptx
@@ -265,7 +265,7 @@
           <a:p>
             <a:fld id="{517F03F4-9A85-49E3-8C3C-66CE3E8B81AA}" type="datetimeFigureOut">
               <a:rPr lang="en-US" smtClean="0"/>
-              <a:t>9/30/2019</a:t>
+              <a:t>10/7/2019</a:t>
             </a:fld>
             <a:endParaRPr lang="en-US"/>
           </a:p>
@@ -435,7 +435,7 @@
           <a:p>
             <a:fld id="{517F03F4-9A85-49E3-8C3C-66CE3E8B81AA}" type="datetimeFigureOut">
               <a:rPr lang="en-US" smtClean="0"/>
-              <a:t>9/30/2019</a:t>
+              <a:t>10/7/2019</a:t>
             </a:fld>
             <a:endParaRPr lang="en-US"/>
           </a:p>
@@ -615,7 +615,7 @@
           <a:p>
             <a:fld id="{517F03F4-9A85-49E3-8C3C-66CE3E8B81AA}" type="datetimeFigureOut">
               <a:rPr lang="en-US" smtClean="0"/>
-              <a:t>9/30/2019</a:t>
+              <a:t>10/7/2019</a:t>
             </a:fld>
             <a:endParaRPr lang="en-US"/>
           </a:p>
@@ -785,7 +785,7 @@
           <a:p>
             <a:fld id="{517F03F4-9A85-49E3-8C3C-66CE3E8B81AA}" type="datetimeFigureOut">
               <a:rPr lang="en-US" smtClean="0"/>
-              <a:t>9/30/2019</a:t>
+              <a:t>10/7/2019</a:t>
             </a:fld>
             <a:endParaRPr lang="en-US"/>
           </a:p>
@@ -1031,7 +1031,7 @@
           <a:p>
             <a:fld id="{517F03F4-9A85-49E3-8C3C-66CE3E8B81AA}" type="datetimeFigureOut">
               <a:rPr lang="en-US" smtClean="0"/>
-              <a:t>9/30/2019</a:t>
+              <a:t>10/7/2019</a:t>
             </a:fld>
             <a:endParaRPr lang="en-US"/>
           </a:p>
@@ -1263,7 +1263,7 @@
           <a:p>
             <a:fld id="{517F03F4-9A85-49E3-8C3C-66CE3E8B81AA}" type="datetimeFigureOut">
               <a:rPr lang="en-US" smtClean="0"/>
-              <a:t>9/30/2019</a:t>
+              <a:t>10/7/2019</a:t>
             </a:fld>
             <a:endParaRPr lang="en-US"/>
           </a:p>
@@ -1630,7 +1630,7 @@
           <a:p>
             <a:fld id="{517F03F4-9A85-49E3-8C3C-66CE3E8B81AA}" type="datetimeFigureOut">
               <a:rPr lang="en-US" smtClean="0"/>
-              <a:t>9/30/2019</a:t>
+              <a:t>10/7/2019</a:t>
             </a:fld>
             <a:endParaRPr lang="en-US"/>
           </a:p>
@@ -1748,7 +1748,7 @@
           <a:p>
             <a:fld id="{517F03F4-9A85-49E3-8C3C-66CE3E8B81AA}" type="datetimeFigureOut">
               <a:rPr lang="en-US" smtClean="0"/>
-              <a:t>9/30/2019</a:t>
+              <a:t>10/7/2019</a:t>
             </a:fld>
             <a:endParaRPr lang="en-US"/>
           </a:p>
@@ -1843,7 +1843,7 @@
           <a:p>
             <a:fld id="{517F03F4-9A85-49E3-8C3C-66CE3E8B81AA}" type="datetimeFigureOut">
               <a:rPr lang="en-US" smtClean="0"/>
-              <a:t>9/30/2019</a:t>
+              <a:t>10/7/2019</a:t>
             </a:fld>
             <a:endParaRPr lang="en-US"/>
           </a:p>
@@ -2120,7 +2120,7 @@
           <a:p>
             <a:fld id="{517F03F4-9A85-49E3-8C3C-66CE3E8B81AA}" type="datetimeFigureOut">
               <a:rPr lang="en-US" smtClean="0"/>
-              <a:t>9/30/2019</a:t>
+              <a:t>10/7/2019</a:t>
             </a:fld>
             <a:endParaRPr lang="en-US"/>
           </a:p>
@@ -2373,7 +2373,7 @@
           <a:p>
             <a:fld id="{517F03F4-9A85-49E3-8C3C-66CE3E8B81AA}" type="datetimeFigureOut">
               <a:rPr lang="en-US" smtClean="0"/>
-              <a:t>9/30/2019</a:t>
+              <a:t>10/7/2019</a:t>
             </a:fld>
             <a:endParaRPr lang="en-US"/>
           </a:p>
@@ -2586,7 +2586,7 @@
           <a:p>
             <a:fld id="{517F03F4-9A85-49E3-8C3C-66CE3E8B81AA}" type="datetimeFigureOut">
               <a:rPr lang="en-US" smtClean="0"/>
-              <a:t>9/30/2019</a:t>
+              <a:t>10/7/2019</a:t>
             </a:fld>
             <a:endParaRPr lang="en-US"/>
           </a:p>
@@ -4550,15 +4550,7 @@
                   <a:srgbClr val="7030A0"/>
                 </a:solidFill>
               </a:rPr>
-              <a:t>HW1, R Lab 1 Friday Oct 4 (Canvas</a:t>
-            </a:r>
-            <a:r>
-              <a:rPr lang="en-US" b="1" dirty="0" smtClean="0">
-                <a:solidFill>
-                  <a:srgbClr val="7030A0"/>
-                </a:solidFill>
-              </a:rPr>
-              <a:t>)</a:t>
+              <a:t>HW1, R Lab 1 Friday Oct 4 (Canvas)</a:t>
             </a:r>
           </a:p>
           <a:p>
@@ -4578,7 +4570,6 @@
               <a:rPr lang="en-US" b="1" dirty="0" smtClean="0"/>
               <a:t>Lecture 3 (distributions, density and mass functions)</a:t>
             </a:r>
-            <a:endParaRPr lang="en-US" b="1" dirty="0" smtClean="0"/>
           </a:p>
         </p:txBody>
       </p:sp>
@@ -4689,13 +4680,13 @@
         </p:nvSpPr>
         <p:spPr>
           <a:xfrm>
-            <a:off x="116958" y="1095157"/>
-            <a:ext cx="6124354" cy="5364125"/>
+            <a:off x="116957" y="1095157"/>
+            <a:ext cx="6898697" cy="5364125"/>
           </a:xfrm>
         </p:spPr>
         <p:txBody>
           <a:bodyPr>
-            <a:normAutofit fontScale="92500" lnSpcReduction="10000"/>
+            <a:normAutofit fontScale="92500" lnSpcReduction="20000"/>
           </a:bodyPr>
           <a:lstStyle/>
           <a:p>
@@ -4706,7 +4697,6 @@
               <a:rPr lang="en-US" dirty="0" smtClean="0"/>
               <a:t>Wednesday Oct 2</a:t>
             </a:r>
-            <a:endParaRPr lang="en-US" dirty="0" smtClean="0"/>
           </a:p>
           <a:p>
             <a:pPr marL="0" indent="0">
@@ -4725,7 +4715,6 @@
               <a:rPr lang="en-US" dirty="0" smtClean="0"/>
               <a:t>Lecture 3: Distributions, density and mass functions (1.3)</a:t>
             </a:r>
-            <a:endParaRPr lang="en-US" dirty="0" smtClean="0"/>
           </a:p>
           <a:p>
             <a:pPr marL="0" indent="0">
@@ -4746,7 +4735,7 @@
                   <a:srgbClr val="7030A0"/>
                 </a:solidFill>
               </a:rPr>
-              <a:t>Quiz 1 Wednesday Oct 2 (in class, Lectures 1-2)</a:t>
+              <a:t>Quiz 1 TODAY (in class, Lectures 1-2)</a:t>
             </a:r>
           </a:p>
           <a:p>
@@ -4759,15 +4748,7 @@
                   <a:srgbClr val="7030A0"/>
                 </a:solidFill>
               </a:rPr>
-              <a:t>HW1, R Lab 1 Friday Oct 4 (Canvas</a:t>
-            </a:r>
-            <a:r>
-              <a:rPr lang="en-US" b="1" dirty="0" smtClean="0">
-                <a:solidFill>
-                  <a:srgbClr val="7030A0"/>
-                </a:solidFill>
-              </a:rPr>
-              <a:t>)</a:t>
+              <a:t>HW1, R Lab 1 Friday Oct 4 (Canvas) *Move to Sunday?</a:t>
             </a:r>
           </a:p>
           <a:p>
@@ -4782,11 +4763,6 @@
               </a:rPr>
               <a:t>Watch lecture 4 on your own! Empirical distributions and summaries</a:t>
             </a:r>
-            <a:endParaRPr lang="en-US" b="1" dirty="0" smtClean="0">
-              <a:solidFill>
-                <a:srgbClr val="7030A0"/>
-              </a:solidFill>
-            </a:endParaRPr>
           </a:p>
           <a:p>
             <a:pPr marL="0" indent="0">
@@ -4802,14 +4778,19 @@
               <a:buNone/>
             </a:pPr>
             <a:r>
-              <a:rPr lang="en-US" b="1" dirty="0"/>
-              <a:t>Lecture </a:t>
-            </a:r>
-            <a:r>
-              <a:rPr lang="en-US" b="1" dirty="0" smtClean="0"/>
-              <a:t>4 (2.1-2.2) activities, Lecture 5 (2.3)(boxplots)</a:t>
-            </a:r>
-            <a:endParaRPr lang="en-US" b="1" dirty="0"/>
+              <a:rPr lang="en-US" dirty="0" smtClean="0"/>
+              <a:t>Finish Lecture 3 (1.3)</a:t>
+            </a:r>
+          </a:p>
+          <a:p>
+            <a:pPr marL="0" indent="0">
+              <a:buNone/>
+            </a:pPr>
+            <a:r>
+              <a:rPr lang="en-US" dirty="0" smtClean="0"/>
+              <a:t>Lecture 4 (2.1-2.2) activities, Lecture 5 (2.3)(boxplots)</a:t>
+            </a:r>
+            <a:endParaRPr lang="en-US" dirty="0"/>
           </a:p>
           <a:p>
             <a:pPr marL="0" indent="0">
@@ -4936,7 +4917,7 @@
         </p:spPr>
         <p:txBody>
           <a:bodyPr>
-            <a:normAutofit/>
+            <a:normAutofit lnSpcReduction="10000"/>
           </a:bodyPr>
           <a:lstStyle/>
           <a:p>
@@ -4947,7 +4928,6 @@
               <a:rPr lang="en-US" dirty="0" smtClean="0"/>
               <a:t>Monday October 7</a:t>
             </a:r>
-            <a:endParaRPr lang="en-US" dirty="0" smtClean="0"/>
           </a:p>
           <a:p>
             <a:pPr marL="0" indent="0">
@@ -4955,11 +4935,7 @@
             </a:pPr>
             <a:r>
               <a:rPr lang="en-US" dirty="0" smtClean="0"/>
-              <a:t>Finish </a:t>
-            </a:r>
-            <a:r>
-              <a:rPr lang="en-US" dirty="0" smtClean="0"/>
-              <a:t>lecture 3</a:t>
+              <a:t>Finish lecture 3</a:t>
             </a:r>
           </a:p>
           <a:p>
@@ -4977,11 +4953,7 @@
             </a:pPr>
             <a:r>
               <a:rPr lang="en-US" dirty="0" smtClean="0"/>
-              <a:t>Important </a:t>
-            </a:r>
-            <a:r>
-              <a:rPr lang="en-US" dirty="0" smtClean="0"/>
-              <a:t>upcoming deadlines:</a:t>
+              <a:t>Important upcoming deadlines:</a:t>
             </a:r>
           </a:p>
           <a:p>
@@ -4994,7 +4966,7 @@
                   <a:srgbClr val="7030A0"/>
                 </a:solidFill>
               </a:rPr>
-              <a:t>Quiz </a:t>
+              <a:t>Quiz 2 Wednesday Oct 9 (in class, Lectures </a:t>
             </a:r>
             <a:r>
               <a:rPr lang="en-US" b="1" dirty="0" smtClean="0">
@@ -5002,81 +4974,7 @@
                   <a:srgbClr val="7030A0"/>
                 </a:solidFill>
               </a:rPr>
-              <a:t>2 Wednesday Oct 9 (in </a:t>
-            </a:r>
-            <a:r>
-              <a:rPr lang="en-US" b="1" dirty="0" smtClean="0">
-                <a:solidFill>
-                  <a:srgbClr val="7030A0"/>
-                </a:solidFill>
-              </a:rPr>
-              <a:t>class, Lectures </a:t>
-            </a:r>
-            <a:r>
-              <a:rPr lang="en-US" b="1" dirty="0" smtClean="0">
-                <a:solidFill>
-                  <a:srgbClr val="7030A0"/>
-                </a:solidFill>
-              </a:rPr>
-              <a:t>3-4)</a:t>
-            </a:r>
-            <a:endParaRPr lang="en-US" b="1" dirty="0" smtClean="0">
-              <a:solidFill>
-                <a:srgbClr val="7030A0"/>
-              </a:solidFill>
-            </a:endParaRPr>
-          </a:p>
-          <a:p>
-            <a:pPr marL="0" indent="0">
-              <a:buNone/>
-            </a:pPr>
-            <a:r>
-              <a:rPr lang="en-US" b="1" dirty="0" smtClean="0">
-                <a:solidFill>
-                  <a:srgbClr val="7030A0"/>
-                </a:solidFill>
-              </a:rPr>
-              <a:t>HW2, </a:t>
-            </a:r>
-            <a:r>
-              <a:rPr lang="en-US" b="1" dirty="0" smtClean="0">
-                <a:solidFill>
-                  <a:srgbClr val="7030A0"/>
-                </a:solidFill>
-              </a:rPr>
-              <a:t>R Lab </a:t>
-            </a:r>
-            <a:r>
-              <a:rPr lang="en-US" b="1" dirty="0" smtClean="0">
-                <a:solidFill>
-                  <a:srgbClr val="7030A0"/>
-                </a:solidFill>
-              </a:rPr>
-              <a:t>2 </a:t>
-            </a:r>
-            <a:r>
-              <a:rPr lang="en-US" b="1" dirty="0" smtClean="0">
-                <a:solidFill>
-                  <a:srgbClr val="7030A0"/>
-                </a:solidFill>
-              </a:rPr>
-              <a:t>Friday Oct </a:t>
-            </a:r>
-            <a:r>
-              <a:rPr lang="en-US" b="1" dirty="0" smtClean="0">
-                <a:solidFill>
-                  <a:srgbClr val="7030A0"/>
-                </a:solidFill>
-              </a:rPr>
-              <a:t>11 </a:t>
-            </a:r>
-            <a:r>
-              <a:rPr lang="en-US" b="1" dirty="0" smtClean="0">
-                <a:solidFill>
-                  <a:srgbClr val="7030A0"/>
-                </a:solidFill>
-              </a:rPr>
-              <a:t>(Canvas</a:t>
+              <a:t>2-4</a:t>
             </a:r>
             <a:r>
               <a:rPr lang="en-US" b="1" dirty="0" smtClean="0">
@@ -5092,9 +4990,59 @@
               <a:buNone/>
             </a:pPr>
             <a:r>
-              <a:rPr lang="en-US" b="1" dirty="0" smtClean="0"/>
-              <a:t>Next time: </a:t>
-            </a:r>
+              <a:rPr lang="en-US" b="1" dirty="0" smtClean="0">
+                <a:solidFill>
+                  <a:srgbClr val="7030A0"/>
+                </a:solidFill>
+              </a:rPr>
+              <a:t>HW2, R Lab 2 </a:t>
+            </a:r>
+            <a:r>
+              <a:rPr lang="en-US" b="1" strike="sngStrike" dirty="0" smtClean="0">
+                <a:solidFill>
+                  <a:srgbClr val="7030A0"/>
+                </a:solidFill>
+              </a:rPr>
+              <a:t>Friday Oct 11</a:t>
+            </a:r>
+            <a:r>
+              <a:rPr lang="en-US" b="1" dirty="0" smtClean="0">
+                <a:solidFill>
+                  <a:srgbClr val="7030A0"/>
+                </a:solidFill>
+              </a:rPr>
+              <a:t> </a:t>
+            </a:r>
+            <a:r>
+              <a:rPr lang="en-US" b="1" dirty="0" smtClean="0">
+                <a:solidFill>
+                  <a:srgbClr val="7030A0"/>
+                </a:solidFill>
+              </a:rPr>
+              <a:t> Sunday Oct 13(Canvas</a:t>
+            </a:r>
+            <a:r>
+              <a:rPr lang="en-US" b="1" dirty="0" smtClean="0">
+                <a:solidFill>
+                  <a:srgbClr val="7030A0"/>
+                </a:solidFill>
+              </a:rPr>
+              <a:t>)</a:t>
+            </a:r>
+          </a:p>
+          <a:p>
+            <a:pPr marL="0" indent="0">
+              <a:buNone/>
+            </a:pPr>
+            <a:r>
+              <a:rPr lang="en-US" b="1" smtClean="0"/>
+              <a:t>Coming up</a:t>
+            </a:r>
+            <a:r>
+              <a:rPr lang="en-US" b="1" smtClean="0"/>
+              <a:t>: </a:t>
+            </a:r>
+            <a:endParaRPr lang="en-US" b="1" dirty="0" smtClean="0"/>
           </a:p>
           <a:p>
             <a:pPr marL="0" indent="0">
@@ -5114,15 +5062,11 @@
               <a:buNone/>
             </a:pPr>
             <a:r>
-              <a:rPr lang="en-US"/>
-              <a:t>Lecture 6 (2.1, 2.2) (expected value and </a:t>
-            </a:r>
-            <a:r>
-              <a:rPr lang="en-US"/>
-              <a:t>variance</a:t>
-            </a:r>
-            <a:r>
-              <a:rPr lang="en-US" smtClean="0"/>
+              <a:rPr lang="en-US" dirty="0"/>
+              <a:t>Lecture 6 (2.1, 2.2) (expected value and variance</a:t>
+            </a:r>
+            <a:r>
+              <a:rPr lang="en-US" dirty="0" smtClean="0"/>
               <a:t>)</a:t>
             </a:r>
             <a:endParaRPr lang="en-US" dirty="0"/>
@@ -5259,7 +5203,6 @@
               <a:rPr lang="en-US" dirty="0" smtClean="0"/>
               <a:t>Wednesday October 9</a:t>
             </a:r>
-            <a:endParaRPr lang="en-US" dirty="0" smtClean="0"/>
           </a:p>
           <a:p>
             <a:pPr marL="0" indent="0">
@@ -5276,11 +5219,7 @@
             </a:pPr>
             <a:r>
               <a:rPr lang="en-US" dirty="0" smtClean="0"/>
-              <a:t>Important </a:t>
-            </a:r>
-            <a:r>
-              <a:rPr lang="en-US" dirty="0" smtClean="0"/>
-              <a:t>upcoming deadlines:</a:t>
+              <a:t>Important upcoming deadlines:</a:t>
             </a:r>
           </a:p>
           <a:p>
@@ -5293,97 +5232,20 @@
                   <a:srgbClr val="7030A0"/>
                 </a:solidFill>
               </a:rPr>
-              <a:t>Quiz </a:t>
-            </a:r>
+              <a:t>Quiz 2 Today! (in class, Lectures 3-4)</a:t>
+            </a:r>
+          </a:p>
+          <a:p>
+            <a:pPr marL="0" indent="0">
+              <a:buNone/>
+            </a:pPr>
             <a:r>
               <a:rPr lang="en-US" b="1" dirty="0" smtClean="0">
                 <a:solidFill>
                   <a:srgbClr val="7030A0"/>
                 </a:solidFill>
               </a:rPr>
-              <a:t>2 Today! (in </a:t>
-            </a:r>
-            <a:r>
-              <a:rPr lang="en-US" b="1" dirty="0" smtClean="0">
-                <a:solidFill>
-                  <a:srgbClr val="7030A0"/>
-                </a:solidFill>
-              </a:rPr>
-              <a:t>class, Lectures </a:t>
-            </a:r>
-            <a:r>
-              <a:rPr lang="en-US" b="1" dirty="0" smtClean="0">
-                <a:solidFill>
-                  <a:srgbClr val="7030A0"/>
-                </a:solidFill>
-              </a:rPr>
-              <a:t>3-4)</a:t>
-            </a:r>
-            <a:endParaRPr lang="en-US" b="1" dirty="0" smtClean="0">
-              <a:solidFill>
-                <a:srgbClr val="7030A0"/>
-              </a:solidFill>
-            </a:endParaRPr>
-          </a:p>
-          <a:p>
-            <a:pPr marL="0" indent="0">
-              <a:buNone/>
-            </a:pPr>
-            <a:r>
-              <a:rPr lang="en-US" b="1" dirty="0" smtClean="0">
-                <a:solidFill>
-                  <a:srgbClr val="7030A0"/>
-                </a:solidFill>
-              </a:rPr>
-              <a:t>HW2, </a:t>
-            </a:r>
-            <a:r>
-              <a:rPr lang="en-US" b="1" dirty="0" smtClean="0">
-                <a:solidFill>
-                  <a:srgbClr val="7030A0"/>
-                </a:solidFill>
-              </a:rPr>
-              <a:t>R Lab </a:t>
-            </a:r>
-            <a:r>
-              <a:rPr lang="en-US" b="1" dirty="0" smtClean="0">
-                <a:solidFill>
-                  <a:srgbClr val="7030A0"/>
-                </a:solidFill>
-              </a:rPr>
-              <a:t>2 </a:t>
-            </a:r>
-            <a:r>
-              <a:rPr lang="en-US" b="1" dirty="0" smtClean="0">
-                <a:solidFill>
-                  <a:srgbClr val="7030A0"/>
-                </a:solidFill>
-              </a:rPr>
-              <a:t>Friday Oct </a:t>
-            </a:r>
-            <a:r>
-              <a:rPr lang="en-US" b="1" dirty="0" smtClean="0">
-                <a:solidFill>
-                  <a:srgbClr val="7030A0"/>
-                </a:solidFill>
-              </a:rPr>
-              <a:t>11 </a:t>
-            </a:r>
-            <a:r>
-              <a:rPr lang="en-US" b="1" dirty="0" smtClean="0">
-                <a:solidFill>
-                  <a:srgbClr val="7030A0"/>
-                </a:solidFill>
-              </a:rPr>
-              <a:t>(Canvas</a:t>
-            </a:r>
-            <a:r>
-              <a:rPr lang="en-US" b="1" dirty="0" smtClean="0">
-                <a:solidFill>
-                  <a:srgbClr val="7030A0"/>
-                </a:solidFill>
-              </a:rPr>
-              <a:t>)</a:t>
+              <a:t>HW2, R Lab 2 Friday Oct 11 (Canvas)</a:t>
             </a:r>
           </a:p>
           <a:p>
@@ -5547,7 +5409,6 @@
               <a:rPr lang="en-US" dirty="0" smtClean="0"/>
               <a:t>Monday October 14</a:t>
             </a:r>
-            <a:endParaRPr lang="en-US" dirty="0" smtClean="0"/>
           </a:p>
           <a:p>
             <a:pPr marL="0" indent="0">
@@ -5557,7 +5418,6 @@
               <a:rPr lang="en-US" dirty="0" smtClean="0"/>
               <a:t>Lecture 6: Expected value and variance</a:t>
             </a:r>
-            <a:endParaRPr lang="en-US" dirty="0" smtClean="0"/>
           </a:p>
           <a:p>
             <a:pPr marL="0" indent="0">
@@ -5578,97 +5438,20 @@
                   <a:srgbClr val="7030A0"/>
                 </a:solidFill>
               </a:rPr>
-              <a:t>Quiz </a:t>
-            </a:r>
+              <a:t>Quiz 2 Today! (in class, Lectures 3-4)</a:t>
+            </a:r>
+          </a:p>
+          <a:p>
+            <a:pPr marL="0" indent="0">
+              <a:buNone/>
+            </a:pPr>
             <a:r>
               <a:rPr lang="en-US" b="1" dirty="0" smtClean="0">
                 <a:solidFill>
                   <a:srgbClr val="7030A0"/>
                 </a:solidFill>
               </a:rPr>
-              <a:t>2 Today! (in </a:t>
-            </a:r>
-            <a:r>
-              <a:rPr lang="en-US" b="1" dirty="0" smtClean="0">
-                <a:solidFill>
-                  <a:srgbClr val="7030A0"/>
-                </a:solidFill>
-              </a:rPr>
-              <a:t>class, Lectures </a:t>
-            </a:r>
-            <a:r>
-              <a:rPr lang="en-US" b="1" dirty="0" smtClean="0">
-                <a:solidFill>
-                  <a:srgbClr val="7030A0"/>
-                </a:solidFill>
-              </a:rPr>
-              <a:t>3-4)</a:t>
-            </a:r>
-            <a:endParaRPr lang="en-US" b="1" dirty="0" smtClean="0">
-              <a:solidFill>
-                <a:srgbClr val="7030A0"/>
-              </a:solidFill>
-            </a:endParaRPr>
-          </a:p>
-          <a:p>
-            <a:pPr marL="0" indent="0">
-              <a:buNone/>
-            </a:pPr>
-            <a:r>
-              <a:rPr lang="en-US" b="1" dirty="0" smtClean="0">
-                <a:solidFill>
-                  <a:srgbClr val="7030A0"/>
-                </a:solidFill>
-              </a:rPr>
-              <a:t>HW2, </a:t>
-            </a:r>
-            <a:r>
-              <a:rPr lang="en-US" b="1" dirty="0" smtClean="0">
-                <a:solidFill>
-                  <a:srgbClr val="7030A0"/>
-                </a:solidFill>
-              </a:rPr>
-              <a:t>R Lab </a:t>
-            </a:r>
-            <a:r>
-              <a:rPr lang="en-US" b="1" dirty="0" smtClean="0">
-                <a:solidFill>
-                  <a:srgbClr val="7030A0"/>
-                </a:solidFill>
-              </a:rPr>
-              <a:t>2 </a:t>
-            </a:r>
-            <a:r>
-              <a:rPr lang="en-US" b="1" dirty="0" smtClean="0">
-                <a:solidFill>
-                  <a:srgbClr val="7030A0"/>
-                </a:solidFill>
-              </a:rPr>
-              <a:t>Friday Oct </a:t>
-            </a:r>
-            <a:r>
-              <a:rPr lang="en-US" b="1" dirty="0" smtClean="0">
-                <a:solidFill>
-                  <a:srgbClr val="7030A0"/>
-                </a:solidFill>
-              </a:rPr>
-              <a:t>11 </a:t>
-            </a:r>
-            <a:r>
-              <a:rPr lang="en-US" b="1" dirty="0" smtClean="0">
-                <a:solidFill>
-                  <a:srgbClr val="7030A0"/>
-                </a:solidFill>
-              </a:rPr>
-              <a:t>(Canvas</a:t>
-            </a:r>
-            <a:r>
-              <a:rPr lang="en-US" b="1" dirty="0" smtClean="0">
-                <a:solidFill>
-                  <a:srgbClr val="7030A0"/>
-                </a:solidFill>
-              </a:rPr>
-              <a:t>)</a:t>
+              <a:t>HW2, R Lab 2 Friday Oct 11 (Canvas)</a:t>
             </a:r>
           </a:p>
           <a:p>
@@ -5695,11 +5478,7 @@
             </a:pPr>
             <a:r>
               <a:rPr lang="en-US" b="1" dirty="0" smtClean="0"/>
-              <a:t>Lecture 7 </a:t>
-            </a:r>
-            <a:r>
-              <a:rPr lang="en-US" b="1" dirty="0" smtClean="0"/>
-              <a:t>(normal probability </a:t>
+              <a:t>Lecture 7 (normal probability </a:t>
             </a:r>
             <a:r>
               <a:rPr lang="en-US" b="1" dirty="0" err="1" smtClean="0"/>
@@ -5709,7 +5488,6 @@
               <a:rPr lang="en-US" b="1" dirty="0" smtClean="0"/>
               <a:t>)</a:t>
             </a:r>
-            <a:endParaRPr lang="en-US" b="1" dirty="0" smtClean="0"/>
           </a:p>
         </p:txBody>
       </p:sp>
@@ -6109,6 +5887,21 @@
 </file>
 
 <file path=customXml/item1.xml><?xml version="1.0" encoding="utf-8"?>
+<p:properties xmlns:p="http://schemas.microsoft.com/office/2006/metadata/properties" xmlns:xsi="http://www.w3.org/2001/XMLSchema-instance" xmlns:pc="http://schemas.microsoft.com/office/infopath/2007/PartnerControls">
+  <documentManagement/>
+</p:properties>
+</file>
+
+<file path=customXml/item2.xml><?xml version="1.0" encoding="utf-8"?>
+<?mso-contentType ?>
+<FormTemplates xmlns="http://schemas.microsoft.com/sharepoint/v3/contenttype/forms">
+  <Display>DocumentLibraryForm</Display>
+  <Edit>DocumentLibraryForm</Edit>
+  <New>DocumentLibraryForm</New>
+</FormTemplates>
+</file>
+
+<file path=customXml/item3.xml><?xml version="1.0" encoding="utf-8"?>
 <ct:contentTypeSchema xmlns:ct="http://schemas.microsoft.com/office/2006/metadata/contentType" xmlns:ma="http://schemas.microsoft.com/office/2006/metadata/properties/metaAttributes" ct:_="" ma:_="" ma:contentTypeName="Document" ma:contentTypeID="0x01010033EA94D264B9FE4796EFD0FC4B443297" ma:contentTypeVersion="7" ma:contentTypeDescription="Create a new document." ma:contentTypeScope="" ma:versionID="8a4da5f121e52cc46130de0328451fe3">
   <xsd:schema xmlns:xsd="http://www.w3.org/2001/XMLSchema" xmlns:xs="http://www.w3.org/2001/XMLSchema" xmlns:p="http://schemas.microsoft.com/office/2006/metadata/properties" xmlns:ns3="75c4949e-fd60-424b-a1f4-eedd874574b5" xmlns:ns4="81b1206d-5dd2-46a3-97d1-b6dcdc343ef3" targetNamespace="http://schemas.microsoft.com/office/2006/metadata/properties" ma:root="true" ma:fieldsID="3a3a910e0565814d04b21eb984f60ac2" ns3:_="" ns4:_="">
     <xsd:import namespace="75c4949e-fd60-424b-a1f4-eedd874574b5"/>
@@ -6293,22 +6086,32 @@
 </ct:contentTypeSchema>
 </file>
 
-<file path=customXml/item2.xml><?xml version="1.0" encoding="utf-8"?>
-<?mso-contentType ?>
-<FormTemplates xmlns="http://schemas.microsoft.com/sharepoint/v3/contenttype/forms">
-  <Display>DocumentLibraryForm</Display>
-  <Edit>DocumentLibraryForm</Edit>
-  <New>DocumentLibraryForm</New>
-</FormTemplates>
+<file path=customXml/itemProps1.xml><?xml version="1.0" encoding="utf-8"?>
+<ds:datastoreItem xmlns:ds="http://schemas.openxmlformats.org/officeDocument/2006/customXml" ds:itemID="{11755299-489E-4F6A-A41C-037BBB4C3A2A}">
+  <ds:schemaRefs>
+    <ds:schemaRef ds:uri="http://purl.org/dc/terms/"/>
+    <ds:schemaRef ds:uri="http://schemas.microsoft.com/office/2006/documentManagement/types"/>
+    <ds:schemaRef ds:uri="http://www.w3.org/XML/1998/namespace"/>
+    <ds:schemaRef ds:uri="http://purl.org/dc/elements/1.1/"/>
+    <ds:schemaRef ds:uri="http://schemas.microsoft.com/office/infopath/2007/PartnerControls"/>
+    <ds:schemaRef ds:uri="http://schemas.microsoft.com/office/2006/metadata/properties"/>
+    <ds:schemaRef ds:uri="http://schemas.openxmlformats.org/package/2006/metadata/core-properties"/>
+    <ds:schemaRef ds:uri="81b1206d-5dd2-46a3-97d1-b6dcdc343ef3"/>
+    <ds:schemaRef ds:uri="75c4949e-fd60-424b-a1f4-eedd874574b5"/>
+    <ds:schemaRef ds:uri="http://purl.org/dc/dcmitype/"/>
+  </ds:schemaRefs>
+</ds:datastoreItem>
 </file>
 
-<file path=customXml/item3.xml><?xml version="1.0" encoding="utf-8"?>
-<p:properties xmlns:p="http://schemas.microsoft.com/office/2006/metadata/properties" xmlns:xsi="http://www.w3.org/2001/XMLSchema-instance" xmlns:pc="http://schemas.microsoft.com/office/infopath/2007/PartnerControls">
-  <documentManagement/>
-</p:properties>
+<file path=customXml/itemProps2.xml><?xml version="1.0" encoding="utf-8"?>
+<ds:datastoreItem xmlns:ds="http://schemas.openxmlformats.org/officeDocument/2006/customXml" ds:itemID="{40BDD2B1-7BD7-48E7-B044-76FBE6A532FE}">
+  <ds:schemaRefs>
+    <ds:schemaRef ds:uri="http://schemas.microsoft.com/sharepoint/v3/contenttype/forms"/>
+  </ds:schemaRefs>
+</ds:datastoreItem>
 </file>
 
-<file path=customXml/itemProps1.xml><?xml version="1.0" encoding="utf-8"?>
+<file path=customXml/itemProps3.xml><?xml version="1.0" encoding="utf-8"?>
 <ds:datastoreItem xmlns:ds="http://schemas.openxmlformats.org/officeDocument/2006/customXml" ds:itemID="{50414C1F-6336-45A2-A0AF-EDE0A4071C1D}">
   <ds:schemaRefs>
     <ds:schemaRef ds:uri="http://schemas.microsoft.com/office/2006/metadata/contentType"/>
@@ -6325,29 +6128,4 @@
     <ds:schemaRef ds:uri="http://schemas.microsoft.com/internal/obd"/>
   </ds:schemaRefs>
 </ds:datastoreItem>
-</file>
-
-<file path=customXml/itemProps2.xml><?xml version="1.0" encoding="utf-8"?>
-<ds:datastoreItem xmlns:ds="http://schemas.openxmlformats.org/officeDocument/2006/customXml" ds:itemID="{40BDD2B1-7BD7-48E7-B044-76FBE6A532FE}">
-  <ds:schemaRefs>
-    <ds:schemaRef ds:uri="http://schemas.microsoft.com/sharepoint/v3/contenttype/forms"/>
-  </ds:schemaRefs>
-</ds:datastoreItem>
-</file>
-
-<file path=customXml/itemProps3.xml><?xml version="1.0" encoding="utf-8"?>
-<ds:datastoreItem xmlns:ds="http://schemas.openxmlformats.org/officeDocument/2006/customXml" ds:itemID="{11755299-489E-4F6A-A41C-037BBB4C3A2A}">
-  <ds:schemaRefs>
-    <ds:schemaRef ds:uri="http://schemas.microsoft.com/office/2006/documentManagement/types"/>
-    <ds:schemaRef ds:uri="http://purl.org/dc/dcmitype/"/>
-    <ds:schemaRef ds:uri="http://schemas.microsoft.com/office/2006/metadata/properties"/>
-    <ds:schemaRef ds:uri="http://schemas.microsoft.com/office/infopath/2007/PartnerControls"/>
-    <ds:schemaRef ds:uri="http://schemas.openxmlformats.org/package/2006/metadata/core-properties"/>
-    <ds:schemaRef ds:uri="75c4949e-fd60-424b-a1f4-eedd874574b5"/>
-    <ds:schemaRef ds:uri="http://purl.org/dc/elements/1.1/"/>
-    <ds:schemaRef ds:uri="81b1206d-5dd2-46a3-97d1-b6dcdc343ef3"/>
-    <ds:schemaRef ds:uri="http://www.w3.org/XML/1998/namespace"/>
-    <ds:schemaRef ds:uri="http://purl.org/dc/terms/"/>
-  </ds:schemaRefs>
-</ds:datastoreItem>
 </file>
</xml_diff>

<commit_message>
updated in class agenda
</commit_message>
<xml_diff>
--- a/TMATH390InClassRProj/TMATH390Au19MW_DailyAgenda.pptx
+++ b/TMATH390InClassRProj/TMATH390Au19MW_DailyAgenda.pptx
@@ -13,12 +13,17 @@
     <p:sldId id="318" r:id="rId10"/>
     <p:sldId id="317" r:id="rId11"/>
     <p:sldId id="319" r:id="rId12"/>
-    <p:sldId id="295" r:id="rId13"/>
+    <p:sldId id="320" r:id="rId13"/>
+    <p:sldId id="321" r:id="rId14"/>
+    <p:sldId id="322" r:id="rId15"/>
+    <p:sldId id="323" r:id="rId16"/>
+    <p:sldId id="324" r:id="rId17"/>
+    <p:sldId id="295" r:id="rId18"/>
   </p:sldIdLst>
   <p:sldSz cx="12192000" cy="6858000"/>
   <p:notesSz cx="6858000" cy="9144000"/>
   <p:custDataLst>
-    <p:tags r:id="rId14"/>
+    <p:tags r:id="rId19"/>
   </p:custDataLst>
   <p:defaultTextStyle>
     <a:defPPr>
@@ -265,7 +270,7 @@
           <a:p>
             <a:fld id="{517F03F4-9A85-49E3-8C3C-66CE3E8B81AA}" type="datetimeFigureOut">
               <a:rPr lang="en-US" smtClean="0"/>
-              <a:t>10/7/2019</a:t>
+              <a:t>10/29/2019</a:t>
             </a:fld>
             <a:endParaRPr lang="en-US"/>
           </a:p>
@@ -435,7 +440,7 @@
           <a:p>
             <a:fld id="{517F03F4-9A85-49E3-8C3C-66CE3E8B81AA}" type="datetimeFigureOut">
               <a:rPr lang="en-US" smtClean="0"/>
-              <a:t>10/7/2019</a:t>
+              <a:t>10/29/2019</a:t>
             </a:fld>
             <a:endParaRPr lang="en-US"/>
           </a:p>
@@ -615,7 +620,7 @@
           <a:p>
             <a:fld id="{517F03F4-9A85-49E3-8C3C-66CE3E8B81AA}" type="datetimeFigureOut">
               <a:rPr lang="en-US" smtClean="0"/>
-              <a:t>10/7/2019</a:t>
+              <a:t>10/29/2019</a:t>
             </a:fld>
             <a:endParaRPr lang="en-US"/>
           </a:p>
@@ -785,7 +790,7 @@
           <a:p>
             <a:fld id="{517F03F4-9A85-49E3-8C3C-66CE3E8B81AA}" type="datetimeFigureOut">
               <a:rPr lang="en-US" smtClean="0"/>
-              <a:t>10/7/2019</a:t>
+              <a:t>10/29/2019</a:t>
             </a:fld>
             <a:endParaRPr lang="en-US"/>
           </a:p>
@@ -1031,7 +1036,7 @@
           <a:p>
             <a:fld id="{517F03F4-9A85-49E3-8C3C-66CE3E8B81AA}" type="datetimeFigureOut">
               <a:rPr lang="en-US" smtClean="0"/>
-              <a:t>10/7/2019</a:t>
+              <a:t>10/29/2019</a:t>
             </a:fld>
             <a:endParaRPr lang="en-US"/>
           </a:p>
@@ -1263,7 +1268,7 @@
           <a:p>
             <a:fld id="{517F03F4-9A85-49E3-8C3C-66CE3E8B81AA}" type="datetimeFigureOut">
               <a:rPr lang="en-US" smtClean="0"/>
-              <a:t>10/7/2019</a:t>
+              <a:t>10/29/2019</a:t>
             </a:fld>
             <a:endParaRPr lang="en-US"/>
           </a:p>
@@ -1630,7 +1635,7 @@
           <a:p>
             <a:fld id="{517F03F4-9A85-49E3-8C3C-66CE3E8B81AA}" type="datetimeFigureOut">
               <a:rPr lang="en-US" smtClean="0"/>
-              <a:t>10/7/2019</a:t>
+              <a:t>10/29/2019</a:t>
             </a:fld>
             <a:endParaRPr lang="en-US"/>
           </a:p>
@@ -1748,7 +1753,7 @@
           <a:p>
             <a:fld id="{517F03F4-9A85-49E3-8C3C-66CE3E8B81AA}" type="datetimeFigureOut">
               <a:rPr lang="en-US" smtClean="0"/>
-              <a:t>10/7/2019</a:t>
+              <a:t>10/29/2019</a:t>
             </a:fld>
             <a:endParaRPr lang="en-US"/>
           </a:p>
@@ -1843,7 +1848,7 @@
           <a:p>
             <a:fld id="{517F03F4-9A85-49E3-8C3C-66CE3E8B81AA}" type="datetimeFigureOut">
               <a:rPr lang="en-US" smtClean="0"/>
-              <a:t>10/7/2019</a:t>
+              <a:t>10/29/2019</a:t>
             </a:fld>
             <a:endParaRPr lang="en-US"/>
           </a:p>
@@ -2120,7 +2125,7 @@
           <a:p>
             <a:fld id="{517F03F4-9A85-49E3-8C3C-66CE3E8B81AA}" type="datetimeFigureOut">
               <a:rPr lang="en-US" smtClean="0"/>
-              <a:t>10/7/2019</a:t>
+              <a:t>10/29/2019</a:t>
             </a:fld>
             <a:endParaRPr lang="en-US"/>
           </a:p>
@@ -2373,7 +2378,7 @@
           <a:p>
             <a:fld id="{517F03F4-9A85-49E3-8C3C-66CE3E8B81AA}" type="datetimeFigureOut">
               <a:rPr lang="en-US" smtClean="0"/>
-              <a:t>10/7/2019</a:t>
+              <a:t>10/29/2019</a:t>
             </a:fld>
             <a:endParaRPr lang="en-US"/>
           </a:p>
@@ -2586,7 +2591,7 @@
           <a:p>
             <a:fld id="{517F03F4-9A85-49E3-8C3C-66CE3E8B81AA}" type="datetimeFigureOut">
               <a:rPr lang="en-US" smtClean="0"/>
-              <a:t>10/7/2019</a:t>
+              <a:t>10/29/2019</a:t>
             </a:fld>
             <a:endParaRPr lang="en-US"/>
           </a:p>
@@ -3177,6 +3182,1059 @@
     <p:extLst>
       <p:ext uri="{BB962C8B-B14F-4D97-AF65-F5344CB8AC3E}">
         <p14:creationId xmlns:p14="http://schemas.microsoft.com/office/powerpoint/2010/main" val="3323693601"/>
+      </p:ext>
+    </p:extLst>
+  </p:cSld>
+  <p:clrMapOvr>
+    <a:masterClrMapping/>
+  </p:clrMapOvr>
+  <p:timing>
+    <p:tnLst>
+      <p:par>
+        <p:cTn id="1" dur="indefinite" restart="never" nodeType="tmRoot"/>
+      </p:par>
+    </p:tnLst>
+  </p:timing>
+</p:sld>
+</file>
+
+<file path=ppt/slides/slide10.xml><?xml version="1.0" encoding="utf-8"?>
+<p:sld xmlns:a="http://schemas.openxmlformats.org/drawingml/2006/main" xmlns:r="http://schemas.openxmlformats.org/officeDocument/2006/relationships" xmlns:p="http://schemas.openxmlformats.org/presentationml/2006/main">
+  <p:cSld>
+    <p:spTree>
+      <p:nvGrpSpPr>
+        <p:cNvPr id="1" name=""/>
+        <p:cNvGrpSpPr/>
+        <p:nvPr/>
+      </p:nvGrpSpPr>
+      <p:grpSpPr>
+        <a:xfrm>
+          <a:off x="0" y="0"/>
+          <a:ext cx="0" cy="0"/>
+          <a:chOff x="0" y="0"/>
+          <a:chExt cx="0" cy="0"/>
+        </a:xfrm>
+      </p:grpSpPr>
+      <p:sp>
+        <p:nvSpPr>
+          <p:cNvPr id="2" name="Title 1"/>
+          <p:cNvSpPr>
+            <a:spLocks noGrp="1"/>
+          </p:cNvSpPr>
+          <p:nvPr>
+            <p:ph type="title"/>
+          </p:nvPr>
+        </p:nvSpPr>
+        <p:spPr>
+          <a:xfrm>
+            <a:off x="116958" y="56669"/>
+            <a:ext cx="10515600" cy="1325563"/>
+          </a:xfrm>
+        </p:spPr>
+        <p:txBody>
+          <a:bodyPr/>
+          <a:lstStyle/>
+          <a:p>
+            <a:r>
+              <a:rPr lang="en-US" dirty="0" smtClean="0"/>
+              <a:t>TMATH390B Autumn 2019</a:t>
+            </a:r>
+            <a:endParaRPr lang="en-US" dirty="0"/>
+          </a:p>
+        </p:txBody>
+      </p:sp>
+      <p:sp>
+        <p:nvSpPr>
+          <p:cNvPr id="3" name="Content Placeholder 2"/>
+          <p:cNvSpPr>
+            <a:spLocks noGrp="1"/>
+          </p:cNvSpPr>
+          <p:nvPr>
+            <p:ph idx="1"/>
+          </p:nvPr>
+        </p:nvSpPr>
+        <p:spPr>
+          <a:xfrm>
+            <a:off x="116958" y="1095157"/>
+            <a:ext cx="6124354" cy="5364125"/>
+          </a:xfrm>
+        </p:spPr>
+        <p:txBody>
+          <a:bodyPr>
+            <a:normAutofit/>
+          </a:bodyPr>
+          <a:lstStyle/>
+          <a:p>
+            <a:pPr marL="0" indent="0">
+              <a:buNone/>
+            </a:pPr>
+            <a:r>
+              <a:rPr lang="en-US" dirty="0" smtClean="0"/>
+              <a:t>Wednesday October 23</a:t>
+            </a:r>
+          </a:p>
+          <a:p>
+            <a:pPr marL="0" indent="0">
+              <a:buNone/>
+            </a:pPr>
+            <a:r>
+              <a:rPr lang="en-US" dirty="0" smtClean="0"/>
+              <a:t>Lecture 7 (1.4): Normal Distribution</a:t>
+            </a:r>
+          </a:p>
+          <a:p>
+            <a:pPr marL="0" indent="0">
+              <a:buNone/>
+            </a:pPr>
+            <a:r>
+              <a:rPr lang="en-US" dirty="0" smtClean="0"/>
+              <a:t>Lecture 8 (1.5,1.6): Other distributions</a:t>
+            </a:r>
+          </a:p>
+          <a:p>
+            <a:pPr marL="0" indent="0">
+              <a:buNone/>
+            </a:pPr>
+            <a:r>
+              <a:rPr lang="en-US" b="1" dirty="0" smtClean="0"/>
+              <a:t>Important upcoming deadlines:</a:t>
+            </a:r>
+          </a:p>
+          <a:p>
+            <a:pPr marL="0" indent="0">
+              <a:buNone/>
+            </a:pPr>
+            <a:r>
+              <a:rPr lang="en-US" b="1" dirty="0" smtClean="0">
+                <a:solidFill>
+                  <a:srgbClr val="7030A0"/>
+                </a:solidFill>
+              </a:rPr>
+              <a:t>HW4, R Lab 4 Sunday Oct 27 (Canvas)</a:t>
+            </a:r>
+          </a:p>
+          <a:p>
+            <a:pPr marL="0" indent="0">
+              <a:buNone/>
+            </a:pPr>
+            <a:r>
+              <a:rPr lang="en-US" b="1" dirty="0" smtClean="0"/>
+              <a:t>Coming up: </a:t>
+            </a:r>
+          </a:p>
+          <a:p>
+            <a:pPr marL="0" indent="0">
+              <a:buNone/>
+            </a:pPr>
+            <a:r>
+              <a:rPr lang="en-US" dirty="0" smtClean="0"/>
+              <a:t>Lecture 8 (1.5,1.6) </a:t>
+            </a:r>
+            <a:endParaRPr lang="en-US" dirty="0"/>
+          </a:p>
+          <a:p>
+            <a:pPr marL="0" indent="0">
+              <a:buNone/>
+            </a:pPr>
+            <a:r>
+              <a:rPr lang="en-US" dirty="0" smtClean="0"/>
+              <a:t>Lecture 9 (1.5): </a:t>
+            </a:r>
+            <a:r>
+              <a:rPr lang="el-GR" dirty="0" smtClean="0"/>
+              <a:t>χ</a:t>
+            </a:r>
+            <a:r>
+              <a:rPr lang="en-US" baseline="30000" dirty="0" smtClean="0"/>
+              <a:t>2</a:t>
+            </a:r>
+            <a:r>
+              <a:rPr lang="en-US" dirty="0" smtClean="0"/>
+              <a:t>, F distributions (watch video on your own!)</a:t>
+            </a:r>
+          </a:p>
+          <a:p>
+            <a:pPr marL="0" indent="0">
+              <a:buNone/>
+            </a:pPr>
+            <a:r>
+              <a:rPr lang="en-US" dirty="0" smtClean="0"/>
+              <a:t>Lecture 10 (5.5,5.6): Sampling distributions</a:t>
+            </a:r>
+          </a:p>
+        </p:txBody>
+      </p:sp>
+      <p:pic>
+        <p:nvPicPr>
+          <p:cNvPr id="4" name="Picture 3"/>
+          <p:cNvPicPr>
+            <a:picLocks noChangeAspect="1"/>
+          </p:cNvPicPr>
+          <p:nvPr/>
+        </p:nvPicPr>
+        <p:blipFill>
+          <a:blip r:embed="rId2" cstate="print">
+            <a:extLst>
+              <a:ext uri="{28A0092B-C50C-407E-A947-70E740481C1C}">
+                <a14:useLocalDpi xmlns:a14="http://schemas.microsoft.com/office/drawing/2010/main" val="0"/>
+              </a:ext>
+            </a:extLst>
+          </a:blip>
+          <a:stretch>
+            <a:fillRect/>
+          </a:stretch>
+        </p:blipFill>
+        <p:spPr>
+          <a:xfrm>
+            <a:off x="7127971" y="750207"/>
+            <a:ext cx="4943527" cy="4943527"/>
+          </a:xfrm>
+          <a:prstGeom prst="rect">
+            <a:avLst/>
+          </a:prstGeom>
+        </p:spPr>
+      </p:pic>
+    </p:spTree>
+    <p:extLst>
+      <p:ext uri="{BB962C8B-B14F-4D97-AF65-F5344CB8AC3E}">
+        <p14:creationId xmlns:p14="http://schemas.microsoft.com/office/powerpoint/2010/main" val="905857532"/>
+      </p:ext>
+    </p:extLst>
+  </p:cSld>
+  <p:clrMapOvr>
+    <a:masterClrMapping/>
+  </p:clrMapOvr>
+  <p:timing>
+    <p:tnLst>
+      <p:par>
+        <p:cTn id="1" dur="indefinite" restart="never" nodeType="tmRoot"/>
+      </p:par>
+    </p:tnLst>
+  </p:timing>
+</p:sld>
+</file>
+
+<file path=ppt/slides/slide11.xml><?xml version="1.0" encoding="utf-8"?>
+<p:sld xmlns:a="http://schemas.openxmlformats.org/drawingml/2006/main" xmlns:r="http://schemas.openxmlformats.org/officeDocument/2006/relationships" xmlns:p="http://schemas.openxmlformats.org/presentationml/2006/main">
+  <p:cSld>
+    <p:spTree>
+      <p:nvGrpSpPr>
+        <p:cNvPr id="1" name=""/>
+        <p:cNvGrpSpPr/>
+        <p:nvPr/>
+      </p:nvGrpSpPr>
+      <p:grpSpPr>
+        <a:xfrm>
+          <a:off x="0" y="0"/>
+          <a:ext cx="0" cy="0"/>
+          <a:chOff x="0" y="0"/>
+          <a:chExt cx="0" cy="0"/>
+        </a:xfrm>
+      </p:grpSpPr>
+      <p:sp>
+        <p:nvSpPr>
+          <p:cNvPr id="2" name="Title 1"/>
+          <p:cNvSpPr>
+            <a:spLocks noGrp="1"/>
+          </p:cNvSpPr>
+          <p:nvPr>
+            <p:ph type="title"/>
+          </p:nvPr>
+        </p:nvSpPr>
+        <p:spPr>
+          <a:xfrm>
+            <a:off x="116958" y="56669"/>
+            <a:ext cx="10515600" cy="1325563"/>
+          </a:xfrm>
+        </p:spPr>
+        <p:txBody>
+          <a:bodyPr/>
+          <a:lstStyle/>
+          <a:p>
+            <a:r>
+              <a:rPr lang="en-US" dirty="0" smtClean="0"/>
+              <a:t>TMATH390B Autumn 2019</a:t>
+            </a:r>
+            <a:endParaRPr lang="en-US" dirty="0"/>
+          </a:p>
+        </p:txBody>
+      </p:sp>
+      <p:sp>
+        <p:nvSpPr>
+          <p:cNvPr id="3" name="Content Placeholder 2"/>
+          <p:cNvSpPr>
+            <a:spLocks noGrp="1"/>
+          </p:cNvSpPr>
+          <p:nvPr>
+            <p:ph idx="1"/>
+          </p:nvPr>
+        </p:nvSpPr>
+        <p:spPr>
+          <a:xfrm>
+            <a:off x="116958" y="1095157"/>
+            <a:ext cx="6124354" cy="5364125"/>
+          </a:xfrm>
+        </p:spPr>
+        <p:txBody>
+          <a:bodyPr>
+            <a:normAutofit fontScale="92500" lnSpcReduction="10000"/>
+          </a:bodyPr>
+          <a:lstStyle/>
+          <a:p>
+            <a:pPr marL="0" indent="0">
+              <a:buNone/>
+            </a:pPr>
+            <a:r>
+              <a:rPr lang="en-US" dirty="0" smtClean="0"/>
+              <a:t>Monday October 28</a:t>
+            </a:r>
+          </a:p>
+          <a:p>
+            <a:pPr marL="0" indent="0">
+              <a:buNone/>
+            </a:pPr>
+            <a:r>
+              <a:rPr lang="en-US" dirty="0" smtClean="0"/>
+              <a:t>Lecture 8 (1.5,1.6): Other distributions</a:t>
+            </a:r>
+          </a:p>
+          <a:p>
+            <a:pPr marL="0" indent="0">
+              <a:buNone/>
+            </a:pPr>
+            <a:r>
+              <a:rPr lang="en-US" b="1" dirty="0" smtClean="0"/>
+              <a:t>Important upcoming deadlines:</a:t>
+            </a:r>
+          </a:p>
+          <a:p>
+            <a:pPr marL="0" indent="0">
+              <a:buNone/>
+            </a:pPr>
+            <a:r>
+              <a:rPr lang="en-US" b="1" dirty="0" smtClean="0">
+                <a:solidFill>
+                  <a:srgbClr val="7030A0"/>
+                </a:solidFill>
+              </a:rPr>
+              <a:t>HW5, R Lab 5 Sunday Nov 3 (Canvas)</a:t>
+            </a:r>
+          </a:p>
+          <a:p>
+            <a:pPr marL="0" indent="0">
+              <a:buNone/>
+            </a:pPr>
+            <a:r>
+              <a:rPr lang="en-US" b="1" dirty="0" smtClean="0">
+                <a:solidFill>
+                  <a:srgbClr val="7030A0"/>
+                </a:solidFill>
+              </a:rPr>
+              <a:t>Docs up on Canvas, quiz forthcoming</a:t>
+            </a:r>
+          </a:p>
+          <a:p>
+            <a:pPr marL="0" indent="0">
+              <a:buNone/>
+            </a:pPr>
+            <a:r>
+              <a:rPr lang="en-US" b="1" dirty="0" smtClean="0">
+                <a:solidFill>
+                  <a:srgbClr val="7030A0"/>
+                </a:solidFill>
+              </a:rPr>
+              <a:t>Quiz Wednesday will be on </a:t>
+            </a:r>
+            <a:r>
+              <a:rPr lang="en-US" b="1" dirty="0" err="1" smtClean="0">
+                <a:solidFill>
+                  <a:srgbClr val="7030A0"/>
+                </a:solidFill>
+              </a:rPr>
+              <a:t>Lectues</a:t>
+            </a:r>
+            <a:r>
+              <a:rPr lang="en-US" b="1" dirty="0" smtClean="0">
+                <a:solidFill>
+                  <a:srgbClr val="7030A0"/>
+                </a:solidFill>
+              </a:rPr>
+              <a:t> 7-8 (normal and other theoretical distributions)</a:t>
+            </a:r>
+          </a:p>
+          <a:p>
+            <a:pPr marL="0" indent="0">
+              <a:buNone/>
+            </a:pPr>
+            <a:r>
+              <a:rPr lang="en-US" b="1" dirty="0" smtClean="0"/>
+              <a:t>Coming up: </a:t>
+            </a:r>
+          </a:p>
+          <a:p>
+            <a:pPr marL="0" indent="0">
+              <a:buNone/>
+            </a:pPr>
+            <a:r>
+              <a:rPr lang="en-US" smtClean="0"/>
+              <a:t>Lecture </a:t>
+            </a:r>
+            <a:r>
+              <a:rPr lang="en-US" dirty="0" smtClean="0"/>
+              <a:t>9 (1.5): </a:t>
+            </a:r>
+            <a:r>
+              <a:rPr lang="el-GR" dirty="0" smtClean="0"/>
+              <a:t>χ</a:t>
+            </a:r>
+            <a:r>
+              <a:rPr lang="en-US" baseline="30000" dirty="0" smtClean="0"/>
+              <a:t>2</a:t>
+            </a:r>
+            <a:r>
+              <a:rPr lang="en-US" dirty="0" smtClean="0"/>
+              <a:t>, F distributions (watch video on your own!)</a:t>
+            </a:r>
+          </a:p>
+          <a:p>
+            <a:pPr marL="0" indent="0">
+              <a:buNone/>
+            </a:pPr>
+            <a:r>
+              <a:rPr lang="en-US" dirty="0" smtClean="0"/>
+              <a:t>Lecture 10 (5.5,5.6): Sampling distributions</a:t>
+            </a:r>
+          </a:p>
+        </p:txBody>
+      </p:sp>
+      <p:pic>
+        <p:nvPicPr>
+          <p:cNvPr id="4" name="Picture 3"/>
+          <p:cNvPicPr>
+            <a:picLocks noChangeAspect="1"/>
+          </p:cNvPicPr>
+          <p:nvPr/>
+        </p:nvPicPr>
+        <p:blipFill>
+          <a:blip r:embed="rId2" cstate="print">
+            <a:extLst>
+              <a:ext uri="{28A0092B-C50C-407E-A947-70E740481C1C}">
+                <a14:useLocalDpi xmlns:a14="http://schemas.microsoft.com/office/drawing/2010/main" val="0"/>
+              </a:ext>
+            </a:extLst>
+          </a:blip>
+          <a:stretch>
+            <a:fillRect/>
+          </a:stretch>
+        </p:blipFill>
+        <p:spPr>
+          <a:xfrm>
+            <a:off x="7127971" y="750207"/>
+            <a:ext cx="4943527" cy="4943527"/>
+          </a:xfrm>
+          <a:prstGeom prst="rect">
+            <a:avLst/>
+          </a:prstGeom>
+        </p:spPr>
+      </p:pic>
+    </p:spTree>
+    <p:extLst>
+      <p:ext uri="{BB962C8B-B14F-4D97-AF65-F5344CB8AC3E}">
+        <p14:creationId xmlns:p14="http://schemas.microsoft.com/office/powerpoint/2010/main" val="265243019"/>
+      </p:ext>
+    </p:extLst>
+  </p:cSld>
+  <p:clrMapOvr>
+    <a:masterClrMapping/>
+  </p:clrMapOvr>
+  <p:timing>
+    <p:tnLst>
+      <p:par>
+        <p:cTn id="1" dur="indefinite" restart="never" nodeType="tmRoot"/>
+      </p:par>
+    </p:tnLst>
+  </p:timing>
+</p:sld>
+</file>
+
+<file path=ppt/slides/slide12.xml><?xml version="1.0" encoding="utf-8"?>
+<p:sld xmlns:a="http://schemas.openxmlformats.org/drawingml/2006/main" xmlns:r="http://schemas.openxmlformats.org/officeDocument/2006/relationships" xmlns:p="http://schemas.openxmlformats.org/presentationml/2006/main">
+  <p:cSld>
+    <p:spTree>
+      <p:nvGrpSpPr>
+        <p:cNvPr id="1" name=""/>
+        <p:cNvGrpSpPr/>
+        <p:nvPr/>
+      </p:nvGrpSpPr>
+      <p:grpSpPr>
+        <a:xfrm>
+          <a:off x="0" y="0"/>
+          <a:ext cx="0" cy="0"/>
+          <a:chOff x="0" y="0"/>
+          <a:chExt cx="0" cy="0"/>
+        </a:xfrm>
+      </p:grpSpPr>
+      <p:sp>
+        <p:nvSpPr>
+          <p:cNvPr id="2" name="Title 1"/>
+          <p:cNvSpPr>
+            <a:spLocks noGrp="1"/>
+          </p:cNvSpPr>
+          <p:nvPr>
+            <p:ph type="title"/>
+          </p:nvPr>
+        </p:nvSpPr>
+        <p:spPr>
+          <a:xfrm>
+            <a:off x="116958" y="56669"/>
+            <a:ext cx="10515600" cy="1325563"/>
+          </a:xfrm>
+        </p:spPr>
+        <p:txBody>
+          <a:bodyPr/>
+          <a:lstStyle/>
+          <a:p>
+            <a:r>
+              <a:rPr lang="en-US" dirty="0" smtClean="0"/>
+              <a:t>TMATH390B Autumn 2019</a:t>
+            </a:r>
+            <a:endParaRPr lang="en-US" dirty="0"/>
+          </a:p>
+        </p:txBody>
+      </p:sp>
+      <p:sp>
+        <p:nvSpPr>
+          <p:cNvPr id="3" name="Content Placeholder 2"/>
+          <p:cNvSpPr>
+            <a:spLocks noGrp="1"/>
+          </p:cNvSpPr>
+          <p:nvPr>
+            <p:ph idx="1"/>
+          </p:nvPr>
+        </p:nvSpPr>
+        <p:spPr>
+          <a:xfrm>
+            <a:off x="116958" y="1095157"/>
+            <a:ext cx="6124354" cy="5364125"/>
+          </a:xfrm>
+        </p:spPr>
+        <p:txBody>
+          <a:bodyPr>
+            <a:normAutofit lnSpcReduction="10000"/>
+          </a:bodyPr>
+          <a:lstStyle/>
+          <a:p>
+            <a:pPr marL="0" indent="0">
+              <a:buNone/>
+            </a:pPr>
+            <a:r>
+              <a:rPr lang="en-US" dirty="0" smtClean="0"/>
+              <a:t>Wednesday </a:t>
+            </a:r>
+            <a:r>
+              <a:rPr lang="en-US" dirty="0" smtClean="0"/>
+              <a:t>October </a:t>
+            </a:r>
+            <a:r>
+              <a:rPr lang="en-US" dirty="0" smtClean="0"/>
+              <a:t>30</a:t>
+            </a:r>
+            <a:endParaRPr lang="en-US" dirty="0" smtClean="0"/>
+          </a:p>
+          <a:p>
+            <a:pPr marL="0" indent="0">
+              <a:buNone/>
+            </a:pPr>
+            <a:r>
+              <a:rPr lang="en-US" dirty="0"/>
+              <a:t>Lecture 9 (1.5): </a:t>
+            </a:r>
+            <a:r>
+              <a:rPr lang="el-GR" dirty="0"/>
+              <a:t>χ</a:t>
+            </a:r>
+            <a:r>
+              <a:rPr lang="en-US" baseline="30000" dirty="0"/>
+              <a:t>2</a:t>
+            </a:r>
+            <a:r>
+              <a:rPr lang="en-US" dirty="0"/>
+              <a:t>, F distributions (watch video on your own!)</a:t>
+            </a:r>
+          </a:p>
+          <a:p>
+            <a:pPr marL="0" indent="0">
+              <a:buNone/>
+            </a:pPr>
+            <a:r>
+              <a:rPr lang="en-US" dirty="0"/>
+              <a:t>Lecture 10 (5.5,5.6): Sampling </a:t>
+            </a:r>
+            <a:r>
+              <a:rPr lang="en-US" dirty="0" smtClean="0"/>
+              <a:t>distributions</a:t>
+            </a:r>
+          </a:p>
+          <a:p>
+            <a:pPr marL="0" indent="0">
+              <a:buNone/>
+            </a:pPr>
+            <a:r>
+              <a:rPr lang="en-US" dirty="0" smtClean="0"/>
+              <a:t>Quiz 4 (important probability distributions)</a:t>
+            </a:r>
+            <a:endParaRPr lang="en-US" dirty="0"/>
+          </a:p>
+          <a:p>
+            <a:pPr marL="0" indent="0">
+              <a:buNone/>
+            </a:pPr>
+            <a:r>
+              <a:rPr lang="en-US" b="1" dirty="0" smtClean="0"/>
+              <a:t>Important </a:t>
+            </a:r>
+            <a:r>
+              <a:rPr lang="en-US" b="1" dirty="0" smtClean="0"/>
+              <a:t>upcoming deadlines:</a:t>
+            </a:r>
+          </a:p>
+          <a:p>
+            <a:pPr marL="0" indent="0">
+              <a:buNone/>
+            </a:pPr>
+            <a:r>
+              <a:rPr lang="en-US" b="1" dirty="0" smtClean="0">
+                <a:solidFill>
+                  <a:srgbClr val="7030A0"/>
+                </a:solidFill>
+              </a:rPr>
+              <a:t>HW5, R Lab 5 Sunday Nov 3 (Canvas)</a:t>
+            </a:r>
+          </a:p>
+          <a:p>
+            <a:pPr marL="0" indent="0">
+              <a:buNone/>
+            </a:pPr>
+            <a:r>
+              <a:rPr lang="en-US" b="1" dirty="0" smtClean="0"/>
+              <a:t>Coming </a:t>
+            </a:r>
+            <a:r>
+              <a:rPr lang="en-US" b="1" dirty="0" smtClean="0"/>
+              <a:t>up: </a:t>
+            </a:r>
+            <a:endParaRPr lang="en-US" b="1" dirty="0" smtClean="0"/>
+          </a:p>
+          <a:p>
+            <a:pPr marL="0" indent="0">
+              <a:buNone/>
+            </a:pPr>
+            <a:r>
+              <a:rPr lang="en-US" dirty="0" smtClean="0"/>
+              <a:t>Lecture 11 Video on your own</a:t>
+            </a:r>
+          </a:p>
+          <a:p>
+            <a:pPr marL="0" indent="0">
+              <a:buNone/>
+            </a:pPr>
+            <a:r>
+              <a:rPr lang="en-US" dirty="0" smtClean="0"/>
+              <a:t>Lecture 12: Estimation</a:t>
+            </a:r>
+            <a:endParaRPr lang="en-US" dirty="0" smtClean="0"/>
+          </a:p>
+        </p:txBody>
+      </p:sp>
+      <p:pic>
+        <p:nvPicPr>
+          <p:cNvPr id="4" name="Picture 3"/>
+          <p:cNvPicPr>
+            <a:picLocks noChangeAspect="1"/>
+          </p:cNvPicPr>
+          <p:nvPr/>
+        </p:nvPicPr>
+        <p:blipFill>
+          <a:blip r:embed="rId2" cstate="print">
+            <a:extLst>
+              <a:ext uri="{28A0092B-C50C-407E-A947-70E740481C1C}">
+                <a14:useLocalDpi xmlns:a14="http://schemas.microsoft.com/office/drawing/2010/main" val="0"/>
+              </a:ext>
+            </a:extLst>
+          </a:blip>
+          <a:stretch>
+            <a:fillRect/>
+          </a:stretch>
+        </p:blipFill>
+        <p:spPr>
+          <a:xfrm>
+            <a:off x="7127971" y="750207"/>
+            <a:ext cx="4943527" cy="4943527"/>
+          </a:xfrm>
+          <a:prstGeom prst="rect">
+            <a:avLst/>
+          </a:prstGeom>
+        </p:spPr>
+      </p:pic>
+    </p:spTree>
+    <p:extLst>
+      <p:ext uri="{BB962C8B-B14F-4D97-AF65-F5344CB8AC3E}">
+        <p14:creationId xmlns:p14="http://schemas.microsoft.com/office/powerpoint/2010/main" val="2477908433"/>
+      </p:ext>
+    </p:extLst>
+  </p:cSld>
+  <p:clrMapOvr>
+    <a:masterClrMapping/>
+  </p:clrMapOvr>
+  <p:timing>
+    <p:tnLst>
+      <p:par>
+        <p:cTn id="1" dur="indefinite" restart="never" nodeType="tmRoot"/>
+      </p:par>
+    </p:tnLst>
+  </p:timing>
+</p:sld>
+</file>
+
+<file path=ppt/slides/slide13.xml><?xml version="1.0" encoding="utf-8"?>
+<p:sld xmlns:a="http://schemas.openxmlformats.org/drawingml/2006/main" xmlns:r="http://schemas.openxmlformats.org/officeDocument/2006/relationships" xmlns:p="http://schemas.openxmlformats.org/presentationml/2006/main">
+  <p:cSld>
+    <p:spTree>
+      <p:nvGrpSpPr>
+        <p:cNvPr id="1" name=""/>
+        <p:cNvGrpSpPr/>
+        <p:nvPr/>
+      </p:nvGrpSpPr>
+      <p:grpSpPr>
+        <a:xfrm>
+          <a:off x="0" y="0"/>
+          <a:ext cx="0" cy="0"/>
+          <a:chOff x="0" y="0"/>
+          <a:chExt cx="0" cy="0"/>
+        </a:xfrm>
+      </p:grpSpPr>
+      <p:sp>
+        <p:nvSpPr>
+          <p:cNvPr id="2" name="Title 1"/>
+          <p:cNvSpPr>
+            <a:spLocks noGrp="1"/>
+          </p:cNvSpPr>
+          <p:nvPr>
+            <p:ph type="title"/>
+          </p:nvPr>
+        </p:nvSpPr>
+        <p:spPr>
+          <a:xfrm>
+            <a:off x="116958" y="56669"/>
+            <a:ext cx="10515600" cy="1325563"/>
+          </a:xfrm>
+        </p:spPr>
+        <p:txBody>
+          <a:bodyPr/>
+          <a:lstStyle/>
+          <a:p>
+            <a:r>
+              <a:rPr lang="en-US" dirty="0" smtClean="0"/>
+              <a:t>TMATH390B Autumn 2019</a:t>
+            </a:r>
+            <a:endParaRPr lang="en-US" dirty="0"/>
+          </a:p>
+        </p:txBody>
+      </p:sp>
+      <p:sp>
+        <p:nvSpPr>
+          <p:cNvPr id="3" name="Content Placeholder 2"/>
+          <p:cNvSpPr>
+            <a:spLocks noGrp="1"/>
+          </p:cNvSpPr>
+          <p:nvPr>
+            <p:ph idx="1"/>
+          </p:nvPr>
+        </p:nvSpPr>
+        <p:spPr>
+          <a:xfrm>
+            <a:off x="116958" y="1095157"/>
+            <a:ext cx="6124354" cy="5364125"/>
+          </a:xfrm>
+        </p:spPr>
+        <p:txBody>
+          <a:bodyPr>
+            <a:normAutofit fontScale="92500" lnSpcReduction="10000"/>
+          </a:bodyPr>
+          <a:lstStyle/>
+          <a:p>
+            <a:pPr marL="0" indent="0">
+              <a:buNone/>
+            </a:pPr>
+            <a:r>
+              <a:rPr lang="en-US" dirty="0" smtClean="0"/>
+              <a:t>Monday November 4</a:t>
+            </a:r>
+            <a:endParaRPr lang="en-US" dirty="0" smtClean="0"/>
+          </a:p>
+          <a:p>
+            <a:pPr marL="0" indent="0">
+              <a:buNone/>
+            </a:pPr>
+            <a:r>
+              <a:rPr lang="en-US" dirty="0"/>
+              <a:t>Lecture 11 Video on your own</a:t>
+            </a:r>
+          </a:p>
+          <a:p>
+            <a:pPr marL="0" indent="0">
+              <a:buNone/>
+            </a:pPr>
+            <a:r>
+              <a:rPr lang="en-US" dirty="0"/>
+              <a:t>Lecture 12: Estimation</a:t>
+            </a:r>
+          </a:p>
+          <a:p>
+            <a:pPr marL="0" indent="0">
+              <a:buNone/>
+            </a:pPr>
+            <a:r>
+              <a:rPr lang="en-US" b="1" dirty="0" smtClean="0"/>
+              <a:t>Important </a:t>
+            </a:r>
+            <a:r>
+              <a:rPr lang="en-US" b="1" dirty="0" smtClean="0"/>
+              <a:t>upcoming deadlines:</a:t>
+            </a:r>
+          </a:p>
+          <a:p>
+            <a:pPr marL="0" indent="0">
+              <a:buNone/>
+            </a:pPr>
+            <a:r>
+              <a:rPr lang="en-US" b="1" dirty="0" smtClean="0">
+                <a:solidFill>
+                  <a:srgbClr val="7030A0"/>
+                </a:solidFill>
+              </a:rPr>
+              <a:t>HW6, </a:t>
+            </a:r>
+            <a:r>
+              <a:rPr lang="en-US" b="1" dirty="0" smtClean="0">
+                <a:solidFill>
+                  <a:srgbClr val="7030A0"/>
+                </a:solidFill>
+              </a:rPr>
+              <a:t>R Lab </a:t>
+            </a:r>
+            <a:r>
+              <a:rPr lang="en-US" b="1" dirty="0" smtClean="0">
+                <a:solidFill>
+                  <a:srgbClr val="7030A0"/>
+                </a:solidFill>
+              </a:rPr>
+              <a:t>6 </a:t>
+            </a:r>
+            <a:r>
+              <a:rPr lang="en-US" b="1" dirty="0" smtClean="0">
+                <a:solidFill>
+                  <a:srgbClr val="7030A0"/>
+                </a:solidFill>
+              </a:rPr>
+              <a:t>Sunday Nov </a:t>
+            </a:r>
+            <a:r>
+              <a:rPr lang="en-US" b="1" dirty="0" smtClean="0">
+                <a:solidFill>
+                  <a:srgbClr val="7030A0"/>
+                </a:solidFill>
+              </a:rPr>
+              <a:t>10 </a:t>
+            </a:r>
+            <a:r>
+              <a:rPr lang="en-US" b="1" dirty="0" smtClean="0">
+                <a:solidFill>
+                  <a:srgbClr val="7030A0"/>
+                </a:solidFill>
+              </a:rPr>
+              <a:t>(Canvas</a:t>
+            </a:r>
+            <a:r>
+              <a:rPr lang="en-US" b="1" dirty="0" smtClean="0">
+                <a:solidFill>
+                  <a:srgbClr val="7030A0"/>
+                </a:solidFill>
+              </a:rPr>
+              <a:t>)</a:t>
+            </a:r>
+          </a:p>
+          <a:p>
+            <a:pPr marL="0" indent="0">
+              <a:buNone/>
+            </a:pPr>
+            <a:r>
+              <a:rPr lang="en-US" b="1" dirty="0" smtClean="0">
+                <a:solidFill>
+                  <a:srgbClr val="7030A0"/>
+                </a:solidFill>
+              </a:rPr>
+              <a:t>Quiz 5. Covers through lecture 12</a:t>
+            </a:r>
+            <a:endParaRPr lang="en-US" b="1" dirty="0" smtClean="0">
+              <a:solidFill>
+                <a:srgbClr val="7030A0"/>
+              </a:solidFill>
+            </a:endParaRPr>
+          </a:p>
+          <a:p>
+            <a:pPr marL="0" indent="0">
+              <a:buNone/>
+            </a:pPr>
+            <a:r>
+              <a:rPr lang="en-US" b="1" dirty="0" smtClean="0"/>
+              <a:t>Coming </a:t>
+            </a:r>
+            <a:r>
+              <a:rPr lang="en-US" b="1" dirty="0" smtClean="0"/>
+              <a:t>up: </a:t>
+            </a:r>
+            <a:endParaRPr lang="en-US" b="1" dirty="0" smtClean="0"/>
+          </a:p>
+          <a:p>
+            <a:pPr marL="0" indent="0">
+              <a:buNone/>
+            </a:pPr>
+            <a:r>
+              <a:rPr lang="en-US" b="1" dirty="0" smtClean="0"/>
+              <a:t>Exam 2. Wednesday November 13 (through this Wednesday’s material, likely Lecture 13 (t-distribution) or 14 (2-sample CI))</a:t>
+            </a:r>
+          </a:p>
+          <a:p>
+            <a:pPr marL="0" indent="0">
+              <a:buNone/>
+            </a:pPr>
+            <a:r>
+              <a:rPr lang="en-US" dirty="0" smtClean="0"/>
+              <a:t>Lecture 13: t-distribution</a:t>
+            </a:r>
+          </a:p>
+          <a:p>
+            <a:pPr marL="0" indent="0">
+              <a:buNone/>
+            </a:pPr>
+            <a:r>
+              <a:rPr lang="en-US" dirty="0" smtClean="0"/>
+              <a:t>Lecture 14: 2-sample estimation</a:t>
+            </a:r>
+            <a:endParaRPr lang="en-US" dirty="0" smtClean="0"/>
+          </a:p>
+        </p:txBody>
+      </p:sp>
+      <p:pic>
+        <p:nvPicPr>
+          <p:cNvPr id="4" name="Picture 3"/>
+          <p:cNvPicPr>
+            <a:picLocks noChangeAspect="1"/>
+          </p:cNvPicPr>
+          <p:nvPr/>
+        </p:nvPicPr>
+        <p:blipFill>
+          <a:blip r:embed="rId2" cstate="print">
+            <a:extLst>
+              <a:ext uri="{28A0092B-C50C-407E-A947-70E740481C1C}">
+                <a14:useLocalDpi xmlns:a14="http://schemas.microsoft.com/office/drawing/2010/main" val="0"/>
+              </a:ext>
+            </a:extLst>
+          </a:blip>
+          <a:stretch>
+            <a:fillRect/>
+          </a:stretch>
+        </p:blipFill>
+        <p:spPr>
+          <a:xfrm>
+            <a:off x="7127971" y="750207"/>
+            <a:ext cx="4943527" cy="4943527"/>
+          </a:xfrm>
+          <a:prstGeom prst="rect">
+            <a:avLst/>
+          </a:prstGeom>
+        </p:spPr>
+      </p:pic>
+    </p:spTree>
+    <p:extLst>
+      <p:ext uri="{BB962C8B-B14F-4D97-AF65-F5344CB8AC3E}">
+        <p14:creationId xmlns:p14="http://schemas.microsoft.com/office/powerpoint/2010/main" val="1075592671"/>
+      </p:ext>
+    </p:extLst>
+  </p:cSld>
+  <p:clrMapOvr>
+    <a:masterClrMapping/>
+  </p:clrMapOvr>
+  <p:timing>
+    <p:tnLst>
+      <p:par>
+        <p:cTn id="1" dur="indefinite" restart="never" nodeType="tmRoot"/>
+      </p:par>
+    </p:tnLst>
+  </p:timing>
+</p:sld>
+</file>
+
+<file path=ppt/slides/slide14.xml><?xml version="1.0" encoding="utf-8"?>
+<p:sld xmlns:a="http://schemas.openxmlformats.org/drawingml/2006/main" xmlns:r="http://schemas.openxmlformats.org/officeDocument/2006/relationships" xmlns:p="http://schemas.openxmlformats.org/presentationml/2006/main">
+  <p:cSld>
+    <p:spTree>
+      <p:nvGrpSpPr>
+        <p:cNvPr id="1" name=""/>
+        <p:cNvGrpSpPr/>
+        <p:nvPr/>
+      </p:nvGrpSpPr>
+      <p:grpSpPr>
+        <a:xfrm>
+          <a:off x="0" y="0"/>
+          <a:ext cx="0" cy="0"/>
+          <a:chOff x="0" y="0"/>
+          <a:chExt cx="0" cy="0"/>
+        </a:xfrm>
+      </p:grpSpPr>
+      <p:sp>
+        <p:nvSpPr>
+          <p:cNvPr id="2" name="Title 1"/>
+          <p:cNvSpPr>
+            <a:spLocks noGrp="1"/>
+          </p:cNvSpPr>
+          <p:nvPr>
+            <p:ph type="title"/>
+          </p:nvPr>
+        </p:nvSpPr>
+        <p:spPr/>
+        <p:txBody>
+          <a:bodyPr/>
+          <a:lstStyle/>
+          <a:p>
+            <a:endParaRPr lang="en-US"/>
+          </a:p>
+        </p:txBody>
+      </p:sp>
+      <p:sp>
+        <p:nvSpPr>
+          <p:cNvPr id="3" name="Content Placeholder 2"/>
+          <p:cNvSpPr>
+            <a:spLocks noGrp="1"/>
+          </p:cNvSpPr>
+          <p:nvPr>
+            <p:ph idx="1"/>
+          </p:nvPr>
+        </p:nvSpPr>
+        <p:spPr/>
+        <p:txBody>
+          <a:bodyPr/>
+          <a:lstStyle/>
+          <a:p>
+            <a:endParaRPr lang="en-US"/>
+          </a:p>
+        </p:txBody>
+      </p:sp>
+    </p:spTree>
+    <p:extLst>
+      <p:ext uri="{BB962C8B-B14F-4D97-AF65-F5344CB8AC3E}">
+        <p14:creationId xmlns:p14="http://schemas.microsoft.com/office/powerpoint/2010/main" val="3770558809"/>
       </p:ext>
     </p:extLst>
   </p:cSld>
@@ -4966,23 +6024,7 @@
                   <a:srgbClr val="7030A0"/>
                 </a:solidFill>
               </a:rPr>
-              <a:t>Quiz 2 Wednesday Oct 9 (in class, Lectures </a:t>
-            </a:r>
-            <a:r>
-              <a:rPr lang="en-US" b="1" dirty="0" smtClean="0">
-                <a:solidFill>
-                  <a:srgbClr val="7030A0"/>
-                </a:solidFill>
-              </a:rPr>
-              <a:t>2-4</a:t>
-            </a:r>
-            <a:r>
-              <a:rPr lang="en-US" b="1" dirty="0" smtClean="0">
-                <a:solidFill>
-                  <a:srgbClr val="7030A0"/>
-                </a:solidFill>
-              </a:rPr>
-              <a:t>)</a:t>
+              <a:t>Quiz 2 Wednesday Oct 9 (in class, Lectures 2-4)</a:t>
             </a:r>
           </a:p>
           <a:p>
@@ -5011,23 +6053,7 @@
                   <a:srgbClr val="7030A0"/>
                 </a:solidFill>
               </a:rPr>
-              <a:t> </a:t>
-            </a:r>
-            <a:r>
-              <a:rPr lang="en-US" b="1" dirty="0" smtClean="0">
-                <a:solidFill>
-                  <a:srgbClr val="7030A0"/>
-                </a:solidFill>
-              </a:rPr>
-              <a:t> Sunday Oct 13 (Canvas</a:t>
-            </a:r>
-            <a:r>
-              <a:rPr lang="en-US" b="1" dirty="0" smtClean="0">
-                <a:solidFill>
-                  <a:srgbClr val="7030A0"/>
-                </a:solidFill>
-              </a:rPr>
-              <a:t>)</a:t>
+              <a:t>  Sunday Oct 13 (Canvas)</a:t>
             </a:r>
           </a:p>
           <a:p>
@@ -5036,13 +6062,8 @@
             </a:pPr>
             <a:r>
               <a:rPr lang="en-US" b="1" dirty="0" smtClean="0"/>
-              <a:t>Coming up</a:t>
-            </a:r>
-            <a:r>
-              <a:rPr lang="en-US" b="1" dirty="0" smtClean="0"/>
-              <a:t>: </a:t>
-            </a:r>
-            <a:endParaRPr lang="en-US" b="1" dirty="0" smtClean="0"/>
+              <a:t>Coming up: </a:t>
+            </a:r>
           </a:p>
           <a:p>
             <a:pPr marL="0" indent="0">
@@ -5339,65 +6360,20 @@
                   <a:srgbClr val="7030A0"/>
                 </a:solidFill>
               </a:rPr>
-              <a:t>Quiz 2 Today! (in class, Lectures </a:t>
-            </a:r>
+              <a:t>Quiz 2 Today! (in class, Lectures 2-3)</a:t>
+            </a:r>
+          </a:p>
+          <a:p>
+            <a:pPr marL="0" indent="0">
+              <a:buNone/>
+            </a:pPr>
             <a:r>
               <a:rPr lang="en-US" b="1" dirty="0" smtClean="0">
                 <a:solidFill>
                   <a:srgbClr val="7030A0"/>
                 </a:solidFill>
               </a:rPr>
-              <a:t>2-3)</a:t>
-            </a:r>
-            <a:endParaRPr lang="en-US" b="1" dirty="0" smtClean="0">
-              <a:solidFill>
-                <a:srgbClr val="7030A0"/>
-              </a:solidFill>
-            </a:endParaRPr>
-          </a:p>
-          <a:p>
-            <a:pPr marL="0" indent="0">
-              <a:buNone/>
-            </a:pPr>
-            <a:r>
-              <a:rPr lang="en-US" b="1" dirty="0" smtClean="0">
-                <a:solidFill>
-                  <a:srgbClr val="7030A0"/>
-                </a:solidFill>
-              </a:rPr>
-              <a:t>HW2, R Lab 2 </a:t>
-            </a:r>
-            <a:r>
-              <a:rPr lang="en-US" b="1" dirty="0" smtClean="0">
-                <a:solidFill>
-                  <a:srgbClr val="7030A0"/>
-                </a:solidFill>
-              </a:rPr>
-              <a:t>Sunday </a:t>
-            </a:r>
-            <a:r>
-              <a:rPr lang="en-US" b="1" dirty="0" smtClean="0">
-                <a:solidFill>
-                  <a:srgbClr val="7030A0"/>
-                </a:solidFill>
-              </a:rPr>
-              <a:t>Oct </a:t>
-            </a:r>
-            <a:r>
-              <a:rPr lang="en-US" b="1" dirty="0" smtClean="0">
-                <a:solidFill>
-                  <a:srgbClr val="7030A0"/>
-                </a:solidFill>
-              </a:rPr>
-              <a:t>13 </a:t>
-            </a:r>
-            <a:r>
-              <a:rPr lang="en-US" b="1" dirty="0" smtClean="0">
-                <a:solidFill>
-                  <a:srgbClr val="7030A0"/>
-                </a:solidFill>
-              </a:rPr>
-              <a:t>(Canvas)</a:t>
+              <a:t>HW2, R Lab 2 Sunday Oct 13 (Canvas)</a:t>
             </a:r>
           </a:p>
           <a:p>
@@ -5408,7 +6384,6 @@
               <a:rPr lang="en-US" b="1" dirty="0" smtClean="0"/>
               <a:t>Coming up: </a:t>
             </a:r>
-            <a:endParaRPr lang="en-US" b="1" dirty="0" smtClean="0"/>
           </a:p>
           <a:p>
             <a:pPr marL="0" indent="0">
@@ -5591,97 +6566,20 @@
                   <a:srgbClr val="7030A0"/>
                 </a:solidFill>
               </a:rPr>
-              <a:t>Quiz </a:t>
-            </a:r>
+              <a:t>Quiz 3 Wednesday! (in class, Lectures 5-6)</a:t>
+            </a:r>
+          </a:p>
+          <a:p>
+            <a:pPr marL="0" indent="0">
+              <a:buNone/>
+            </a:pPr>
             <a:r>
               <a:rPr lang="en-US" b="1" dirty="0" smtClean="0">
                 <a:solidFill>
                   <a:srgbClr val="7030A0"/>
                 </a:solidFill>
               </a:rPr>
-              <a:t>3 Wednesday</a:t>
-            </a:r>
-            <a:r>
-              <a:rPr lang="en-US" b="1" dirty="0" smtClean="0">
-                <a:solidFill>
-                  <a:srgbClr val="7030A0"/>
-                </a:solidFill>
-              </a:rPr>
-              <a:t>! (in class, Lectures </a:t>
-            </a:r>
-            <a:r>
-              <a:rPr lang="en-US" b="1" dirty="0" smtClean="0">
-                <a:solidFill>
-                  <a:srgbClr val="7030A0"/>
-                </a:solidFill>
-              </a:rPr>
-              <a:t>5-6)</a:t>
-            </a:r>
-            <a:endParaRPr lang="en-US" b="1" dirty="0" smtClean="0">
-              <a:solidFill>
-                <a:srgbClr val="7030A0"/>
-              </a:solidFill>
-            </a:endParaRPr>
-          </a:p>
-          <a:p>
-            <a:pPr marL="0" indent="0">
-              <a:buNone/>
-            </a:pPr>
-            <a:r>
-              <a:rPr lang="en-US" b="1" dirty="0" smtClean="0">
-                <a:solidFill>
-                  <a:srgbClr val="7030A0"/>
-                </a:solidFill>
-              </a:rPr>
-              <a:t>HW3, </a:t>
-            </a:r>
-            <a:r>
-              <a:rPr lang="en-US" b="1" dirty="0" smtClean="0">
-                <a:solidFill>
-                  <a:srgbClr val="7030A0"/>
-                </a:solidFill>
-              </a:rPr>
-              <a:t>R Lab </a:t>
-            </a:r>
-            <a:r>
-              <a:rPr lang="en-US" b="1" dirty="0" smtClean="0">
-                <a:solidFill>
-                  <a:srgbClr val="7030A0"/>
-                </a:solidFill>
-              </a:rPr>
-              <a:t>3 Sunday </a:t>
-            </a:r>
-            <a:r>
-              <a:rPr lang="en-US" b="1" dirty="0" smtClean="0">
-                <a:solidFill>
-                  <a:srgbClr val="7030A0"/>
-                </a:solidFill>
-              </a:rPr>
-              <a:t>Oct </a:t>
-            </a:r>
-            <a:r>
-              <a:rPr lang="en-US" b="1" dirty="0" smtClean="0">
-                <a:solidFill>
-                  <a:srgbClr val="7030A0"/>
-                </a:solidFill>
-              </a:rPr>
-              <a:t>20</a:t>
-            </a:r>
-            <a:r>
-              <a:rPr lang="en-US" b="1" dirty="0" smtClean="0">
-                <a:solidFill>
-                  <a:srgbClr val="7030A0"/>
-                </a:solidFill>
-              </a:rPr>
-              <a:t> </a:t>
-            </a:r>
-            <a:r>
-              <a:rPr lang="en-US" b="1" dirty="0" smtClean="0">
-                <a:solidFill>
-                  <a:srgbClr val="7030A0"/>
-                </a:solidFill>
-              </a:rPr>
-              <a:t>(Canvas)</a:t>
+              <a:t>HW3, R Lab 3 Sunday Oct 20 (Canvas)</a:t>
             </a:r>
           </a:p>
           <a:p>
@@ -5692,7 +6590,6 @@
               <a:rPr lang="en-US" b="1" dirty="0" smtClean="0"/>
               <a:t>Coming up: </a:t>
             </a:r>
-            <a:endParaRPr lang="en-US" b="1" dirty="0" smtClean="0"/>
           </a:p>
           <a:p>
             <a:pPr marL="0" indent="0">
@@ -5709,11 +6606,7 @@
             </a:pPr>
             <a:r>
               <a:rPr lang="en-US" b="1" dirty="0" smtClean="0"/>
-              <a:t>Lecture 7 (normal probability </a:t>
-            </a:r>
-            <a:r>
-              <a:rPr lang="en-US" b="1" dirty="0" smtClean="0"/>
-              <a:t>distribution)</a:t>
+              <a:t>Lecture 7 (normal probability distribution)</a:t>
             </a:r>
           </a:p>
           <a:p>
@@ -5809,12 +6702,21 @@
             <p:ph type="title"/>
           </p:nvPr>
         </p:nvSpPr>
-        <p:spPr/>
+        <p:spPr>
+          <a:xfrm>
+            <a:off x="116958" y="56669"/>
+            <a:ext cx="10515600" cy="1325563"/>
+          </a:xfrm>
+        </p:spPr>
         <p:txBody>
           <a:bodyPr/>
           <a:lstStyle/>
           <a:p>
-            <a:endParaRPr lang="en-US"/>
+            <a:r>
+              <a:rPr lang="en-US" dirty="0" smtClean="0"/>
+              <a:t>TMATH390B Autumn 2019</a:t>
+            </a:r>
+            <a:endParaRPr lang="en-US" dirty="0"/>
           </a:p>
         </p:txBody>
       </p:sp>
@@ -5828,19 +6730,142 @@
             <p:ph idx="1"/>
           </p:nvPr>
         </p:nvSpPr>
-        <p:spPr/>
-        <p:txBody>
-          <a:bodyPr/>
-          <a:lstStyle/>
-          <a:p>
-            <a:endParaRPr lang="en-US"/>
-          </a:p>
-        </p:txBody>
-      </p:sp>
+        <p:spPr>
+          <a:xfrm>
+            <a:off x="116958" y="1095157"/>
+            <a:ext cx="6124354" cy="5364125"/>
+          </a:xfrm>
+        </p:spPr>
+        <p:txBody>
+          <a:bodyPr>
+            <a:normAutofit fontScale="92500"/>
+          </a:bodyPr>
+          <a:lstStyle/>
+          <a:p>
+            <a:pPr marL="0" indent="0">
+              <a:buNone/>
+            </a:pPr>
+            <a:r>
+              <a:rPr lang="en-US" dirty="0" smtClean="0"/>
+              <a:t>Wednesday October 16</a:t>
+            </a:r>
+          </a:p>
+          <a:p>
+            <a:pPr marL="0" indent="0">
+              <a:buNone/>
+            </a:pPr>
+            <a:r>
+              <a:rPr lang="en-US" dirty="0" smtClean="0"/>
+              <a:t>Lecture 7: Normal Distribution</a:t>
+            </a:r>
+          </a:p>
+          <a:p>
+            <a:pPr marL="0" indent="0">
+              <a:buNone/>
+            </a:pPr>
+            <a:r>
+              <a:rPr lang="en-US" dirty="0" smtClean="0"/>
+              <a:t>Important upcoming deadlines:</a:t>
+            </a:r>
+          </a:p>
+          <a:p>
+            <a:pPr marL="0" indent="0">
+              <a:buNone/>
+            </a:pPr>
+            <a:r>
+              <a:rPr lang="en-US" b="1" dirty="0" smtClean="0">
+                <a:solidFill>
+                  <a:srgbClr val="7030A0"/>
+                </a:solidFill>
+              </a:rPr>
+              <a:t>Quiz 3 TODAY! (in class, Lectures 5-6)</a:t>
+            </a:r>
+          </a:p>
+          <a:p>
+            <a:pPr marL="0" indent="0">
+              <a:buNone/>
+            </a:pPr>
+            <a:r>
+              <a:rPr lang="en-US" b="1" dirty="0" smtClean="0">
+                <a:solidFill>
+                  <a:srgbClr val="7030A0"/>
+                </a:solidFill>
+              </a:rPr>
+              <a:t>HW3, R Lab 3 Sunday Oct 20 (Canvas)</a:t>
+            </a:r>
+          </a:p>
+          <a:p>
+            <a:pPr marL="0" indent="0">
+              <a:buNone/>
+            </a:pPr>
+            <a:r>
+              <a:rPr lang="en-US" b="1" dirty="0" smtClean="0"/>
+              <a:t>Coming up: </a:t>
+            </a:r>
+          </a:p>
+          <a:p>
+            <a:pPr marL="0" indent="0">
+              <a:buNone/>
+            </a:pPr>
+            <a:r>
+              <a:rPr lang="en-US" b="1" dirty="0" smtClean="0"/>
+              <a:t>Exam 1 Monday Oct 21. Covers lectures 1-6</a:t>
+            </a:r>
+          </a:p>
+          <a:p>
+            <a:pPr marL="0" indent="0">
+              <a:buNone/>
+            </a:pPr>
+            <a:r>
+              <a:rPr lang="en-US" b="1" dirty="0" smtClean="0"/>
+              <a:t>One 8.5x11” page of notes, handwritten, front and back. Calculator. Full class time</a:t>
+            </a:r>
+          </a:p>
+          <a:p>
+            <a:pPr marL="0" indent="0">
+              <a:buNone/>
+            </a:pPr>
+            <a:r>
+              <a:rPr lang="en-US" b="1" dirty="0" smtClean="0"/>
+              <a:t>Lecture 7, 8 next Wednesday Quiz 4 next Wednesday covers lecture 7</a:t>
+            </a:r>
+          </a:p>
+        </p:txBody>
+      </p:sp>
+      <p:pic>
+        <p:nvPicPr>
+          <p:cNvPr id="4" name="Picture 3"/>
+          <p:cNvPicPr>
+            <a:picLocks noChangeAspect="1"/>
+          </p:cNvPicPr>
+          <p:nvPr/>
+        </p:nvPicPr>
+        <p:blipFill>
+          <a:blip r:embed="rId2" cstate="print">
+            <a:extLst>
+              <a:ext uri="{28A0092B-C50C-407E-A947-70E740481C1C}">
+                <a14:useLocalDpi xmlns:a14="http://schemas.microsoft.com/office/drawing/2010/main" val="0"/>
+              </a:ext>
+            </a:extLst>
+          </a:blip>
+          <a:stretch>
+            <a:fillRect/>
+          </a:stretch>
+        </p:blipFill>
+        <p:spPr>
+          <a:xfrm>
+            <a:off x="7127971" y="750207"/>
+            <a:ext cx="4943527" cy="4943527"/>
+          </a:xfrm>
+          <a:prstGeom prst="rect">
+            <a:avLst/>
+          </a:prstGeom>
+        </p:spPr>
+      </p:pic>
     </p:spTree>
     <p:extLst>
       <p:ext uri="{BB962C8B-B14F-4D97-AF65-F5344CB8AC3E}">
-        <p14:creationId xmlns:p14="http://schemas.microsoft.com/office/powerpoint/2010/main" val="3770558809"/>
+        <p14:creationId xmlns:p14="http://schemas.microsoft.com/office/powerpoint/2010/main" val="2604619588"/>
       </p:ext>
     </p:extLst>
   </p:cSld>
@@ -6128,21 +7153,6 @@
 </file>
 
 <file path=customXml/item1.xml><?xml version="1.0" encoding="utf-8"?>
-<p:properties xmlns:p="http://schemas.microsoft.com/office/2006/metadata/properties" xmlns:xsi="http://www.w3.org/2001/XMLSchema-instance" xmlns:pc="http://schemas.microsoft.com/office/infopath/2007/PartnerControls">
-  <documentManagement/>
-</p:properties>
-</file>
-
-<file path=customXml/item2.xml><?xml version="1.0" encoding="utf-8"?>
-<?mso-contentType ?>
-<FormTemplates xmlns="http://schemas.microsoft.com/sharepoint/v3/contenttype/forms">
-  <Display>DocumentLibraryForm</Display>
-  <Edit>DocumentLibraryForm</Edit>
-  <New>DocumentLibraryForm</New>
-</FormTemplates>
-</file>
-
-<file path=customXml/item3.xml><?xml version="1.0" encoding="utf-8"?>
 <ct:contentTypeSchema xmlns:ct="http://schemas.microsoft.com/office/2006/metadata/contentType" xmlns:ma="http://schemas.microsoft.com/office/2006/metadata/properties/metaAttributes" ct:_="" ma:_="" ma:contentTypeName="Document" ma:contentTypeID="0x01010033EA94D264B9FE4796EFD0FC4B443297" ma:contentTypeVersion="7" ma:contentTypeDescription="Create a new document." ma:contentTypeScope="" ma:versionID="8a4da5f121e52cc46130de0328451fe3">
   <xsd:schema xmlns:xsd="http://www.w3.org/2001/XMLSchema" xmlns:xs="http://www.w3.org/2001/XMLSchema" xmlns:p="http://schemas.microsoft.com/office/2006/metadata/properties" xmlns:ns3="75c4949e-fd60-424b-a1f4-eedd874574b5" xmlns:ns4="81b1206d-5dd2-46a3-97d1-b6dcdc343ef3" targetNamespace="http://schemas.microsoft.com/office/2006/metadata/properties" ma:root="true" ma:fieldsID="3a3a910e0565814d04b21eb984f60ac2" ns3:_="" ns4:_="">
     <xsd:import namespace="75c4949e-fd60-424b-a1f4-eedd874574b5"/>
@@ -6327,32 +7337,22 @@
 </ct:contentTypeSchema>
 </file>
 
-<file path=customXml/itemProps1.xml><?xml version="1.0" encoding="utf-8"?>
-<ds:datastoreItem xmlns:ds="http://schemas.openxmlformats.org/officeDocument/2006/customXml" ds:itemID="{11755299-489E-4F6A-A41C-037BBB4C3A2A}">
-  <ds:schemaRefs>
-    <ds:schemaRef ds:uri="http://purl.org/dc/terms/"/>
-    <ds:schemaRef ds:uri="http://schemas.microsoft.com/office/2006/documentManagement/types"/>
-    <ds:schemaRef ds:uri="http://www.w3.org/XML/1998/namespace"/>
-    <ds:schemaRef ds:uri="http://purl.org/dc/elements/1.1/"/>
-    <ds:schemaRef ds:uri="http://schemas.microsoft.com/office/infopath/2007/PartnerControls"/>
-    <ds:schemaRef ds:uri="http://schemas.microsoft.com/office/2006/metadata/properties"/>
-    <ds:schemaRef ds:uri="http://schemas.openxmlformats.org/package/2006/metadata/core-properties"/>
-    <ds:schemaRef ds:uri="81b1206d-5dd2-46a3-97d1-b6dcdc343ef3"/>
-    <ds:schemaRef ds:uri="75c4949e-fd60-424b-a1f4-eedd874574b5"/>
-    <ds:schemaRef ds:uri="http://purl.org/dc/dcmitype/"/>
-  </ds:schemaRefs>
-</ds:datastoreItem>
+<file path=customXml/item2.xml><?xml version="1.0" encoding="utf-8"?>
+<?mso-contentType ?>
+<FormTemplates xmlns="http://schemas.microsoft.com/sharepoint/v3/contenttype/forms">
+  <Display>DocumentLibraryForm</Display>
+  <Edit>DocumentLibraryForm</Edit>
+  <New>DocumentLibraryForm</New>
+</FormTemplates>
 </file>
 
-<file path=customXml/itemProps2.xml><?xml version="1.0" encoding="utf-8"?>
-<ds:datastoreItem xmlns:ds="http://schemas.openxmlformats.org/officeDocument/2006/customXml" ds:itemID="{40BDD2B1-7BD7-48E7-B044-76FBE6A532FE}">
-  <ds:schemaRefs>
-    <ds:schemaRef ds:uri="http://schemas.microsoft.com/sharepoint/v3/contenttype/forms"/>
-  </ds:schemaRefs>
-</ds:datastoreItem>
+<file path=customXml/item3.xml><?xml version="1.0" encoding="utf-8"?>
+<p:properties xmlns:p="http://schemas.microsoft.com/office/2006/metadata/properties" xmlns:xsi="http://www.w3.org/2001/XMLSchema-instance" xmlns:pc="http://schemas.microsoft.com/office/infopath/2007/PartnerControls">
+  <documentManagement/>
+</p:properties>
 </file>
 
-<file path=customXml/itemProps3.xml><?xml version="1.0" encoding="utf-8"?>
+<file path=customXml/itemProps1.xml><?xml version="1.0" encoding="utf-8"?>
 <ds:datastoreItem xmlns:ds="http://schemas.openxmlformats.org/officeDocument/2006/customXml" ds:itemID="{50414C1F-6336-45A2-A0AF-EDE0A4071C1D}">
   <ds:schemaRefs>
     <ds:schemaRef ds:uri="http://schemas.microsoft.com/office/2006/metadata/contentType"/>
@@ -6369,4 +7369,29 @@
     <ds:schemaRef ds:uri="http://schemas.microsoft.com/internal/obd"/>
   </ds:schemaRefs>
 </ds:datastoreItem>
+</file>
+
+<file path=customXml/itemProps2.xml><?xml version="1.0" encoding="utf-8"?>
+<ds:datastoreItem xmlns:ds="http://schemas.openxmlformats.org/officeDocument/2006/customXml" ds:itemID="{40BDD2B1-7BD7-48E7-B044-76FBE6A532FE}">
+  <ds:schemaRefs>
+    <ds:schemaRef ds:uri="http://schemas.microsoft.com/sharepoint/v3/contenttype/forms"/>
+  </ds:schemaRefs>
+</ds:datastoreItem>
+</file>
+
+<file path=customXml/itemProps3.xml><?xml version="1.0" encoding="utf-8"?>
+<ds:datastoreItem xmlns:ds="http://schemas.openxmlformats.org/officeDocument/2006/customXml" ds:itemID="{11755299-489E-4F6A-A41C-037BBB4C3A2A}">
+  <ds:schemaRefs>
+    <ds:schemaRef ds:uri="http://purl.org/dc/terms/"/>
+    <ds:schemaRef ds:uri="http://schemas.microsoft.com/office/2006/documentManagement/types"/>
+    <ds:schemaRef ds:uri="http://www.w3.org/XML/1998/namespace"/>
+    <ds:schemaRef ds:uri="http://purl.org/dc/elements/1.1/"/>
+    <ds:schemaRef ds:uri="http://schemas.microsoft.com/office/infopath/2007/PartnerControls"/>
+    <ds:schemaRef ds:uri="http://schemas.microsoft.com/office/2006/metadata/properties"/>
+    <ds:schemaRef ds:uri="http://schemas.openxmlformats.org/package/2006/metadata/core-properties"/>
+    <ds:schemaRef ds:uri="81b1206d-5dd2-46a3-97d1-b6dcdc343ef3"/>
+    <ds:schemaRef ds:uri="75c4949e-fd60-424b-a1f4-eedd874574b5"/>
+    <ds:schemaRef ds:uri="http://purl.org/dc/dcmitype/"/>
+  </ds:schemaRefs>
+</ds:datastoreItem>
 </file>
</xml_diff>